<commit_message>
Updating Session Two slides
</commit_message>
<xml_diff>
--- a/session_two/session_two_presentation.pptx
+++ b/session_two/session_two_presentation.pptx
@@ -185,123 +185,6 @@
 
 <file path=ppt/changesInfos/changesInfo1.xml><?xml version="1.0" encoding="utf-8"?>
 <pc:chgInfo xmlns:a="http://schemas.openxmlformats.org/drawingml/2006/main" xmlns:r="http://schemas.openxmlformats.org/officeDocument/2006/relationships" xmlns:ac="http://schemas.microsoft.com/office/drawing/2013/main/command" xmlns:pc="http://schemas.microsoft.com/office/powerpoint/2013/main/command">
-  <pc:docChgLst>
-    <pc:chgData name="McKinney, David" userId="S::kqkh779@astrazeneca.net::8b945cb3-78ce-42d7-adc5-b07bab32cd5b" providerId="AD" clId="Web-{7452821F-C3D1-4F7E-A975-9F3C59B113CD}"/>
-  </pc:docChgLst>
-  <pc:docChgLst>
-    <pc:chgData name="Bradley, Sam" userId="S::kwgk592@astrazeneca.net::f75c196c-0419-4ed7-9101-2e14ae32ff77" providerId="AD" clId="Web-{19D16AB9-1FF2-4740-8107-2440C047CBCF}"/>
-  </pc:docChgLst>
-  <pc:docChgLst>
-    <pc:chgData name="Bradley, Sam" userId="S::kwgk592@astrazeneca.net::f75c196c-0419-4ed7-9101-2e14ae32ff77" providerId="AD" clId="Web-{5CC56428-C25D-40EB-847A-A98786CC8A93}"/>
-  </pc:docChgLst>
-  <pc:docChgLst>
-    <pc:chgData name="Whittaker, Ryan" userId="S::kbqc931@astrazeneca.net::873b3a98-b8cc-426f-9da0-8dcfa40dc643" providerId="AD" clId="Web-{2CD48DDE-551F-4792-BDF2-CD2098FB28F6}"/>
-  </pc:docChgLst>
-  <pc:docChgLst>
-    <pc:chgData name="Hargreaves, Tim" userId="90cf5d3a-17ee-49d5-b3bb-4550ca7cb171" providerId="ADAL" clId="{5DFC5665-DC49-40E8-A176-7B6AE2F9733A}"/>
-  </pc:docChgLst>
-  <pc:docChgLst>
-    <pc:chgData name="McKinney, David" userId="S::kqkh779@astrazeneca.net::8b945cb3-78ce-42d7-adc5-b07bab32cd5b" providerId="AD" clId="Web-{A3F1E17F-75AC-45B8-AC87-605E8FE95041}"/>
-    <pc:docChg chg="addSld modSld">
-      <pc:chgData name="McKinney, David" userId="S::kqkh779@astrazeneca.net::8b945cb3-78ce-42d7-adc5-b07bab32cd5b" providerId="AD" clId="Web-{A3F1E17F-75AC-45B8-AC87-605E8FE95041}" dt="2020-02-13T11:48:59.943" v="45" actId="1076"/>
-      <pc:docMkLst>
-        <pc:docMk/>
-      </pc:docMkLst>
-      <pc:sldChg chg="modSp">
-        <pc:chgData name="McKinney, David" userId="S::kqkh779@astrazeneca.net::8b945cb3-78ce-42d7-adc5-b07bab32cd5b" providerId="AD" clId="Web-{A3F1E17F-75AC-45B8-AC87-605E8FE95041}" dt="2020-02-13T11:45:09.740" v="21" actId="20577"/>
-        <pc:sldMkLst>
-          <pc:docMk/>
-          <pc:sldMk cId="2499478442" sldId="365"/>
-        </pc:sldMkLst>
-        <pc:spChg chg="mod">
-          <ac:chgData name="McKinney, David" userId="S::kqkh779@astrazeneca.net::8b945cb3-78ce-42d7-adc5-b07bab32cd5b" providerId="AD" clId="Web-{A3F1E17F-75AC-45B8-AC87-605E8FE95041}" dt="2020-02-13T11:45:09.740" v="21" actId="20577"/>
-          <ac:spMkLst>
-            <pc:docMk/>
-            <pc:sldMk cId="2499478442" sldId="365"/>
-            <ac:spMk id="3" creationId="{D9F59F0A-AA59-4F15-95CC-124F6F55180D}"/>
-          </ac:spMkLst>
-        </pc:spChg>
-      </pc:sldChg>
-      <pc:sldChg chg="addSp delSp modSp add replId">
-        <pc:chgData name="McKinney, David" userId="S::kqkh779@astrazeneca.net::8b945cb3-78ce-42d7-adc5-b07bab32cd5b" providerId="AD" clId="Web-{A3F1E17F-75AC-45B8-AC87-605E8FE95041}" dt="2020-02-13T11:48:59.943" v="45" actId="1076"/>
-        <pc:sldMkLst>
-          <pc:docMk/>
-          <pc:sldMk cId="2819223974" sldId="422"/>
-        </pc:sldMkLst>
-        <pc:spChg chg="mod">
-          <ac:chgData name="McKinney, David" userId="S::kqkh779@astrazeneca.net::8b945cb3-78ce-42d7-adc5-b07bab32cd5b" providerId="AD" clId="Web-{A3F1E17F-75AC-45B8-AC87-605E8FE95041}" dt="2020-02-13T11:45:14.911" v="23" actId="20577"/>
-          <ac:spMkLst>
-            <pc:docMk/>
-            <pc:sldMk cId="2819223974" sldId="422"/>
-            <ac:spMk id="3" creationId="{D9F59F0A-AA59-4F15-95CC-124F6F55180D}"/>
-          </ac:spMkLst>
-        </pc:spChg>
-        <pc:picChg chg="del">
-          <ac:chgData name="McKinney, David" userId="S::kqkh779@astrazeneca.net::8b945cb3-78ce-42d7-adc5-b07bab32cd5b" providerId="AD" clId="Web-{A3F1E17F-75AC-45B8-AC87-605E8FE95041}" dt="2020-02-13T11:48:40.850" v="36"/>
-          <ac:picMkLst>
-            <pc:docMk/>
-            <pc:sldMk cId="2819223974" sldId="422"/>
-            <ac:picMk id="5" creationId="{EB4C028F-E23D-4091-962F-46D6A6A0B8A1}"/>
-          </ac:picMkLst>
-        </pc:picChg>
-        <pc:picChg chg="add del mod">
-          <ac:chgData name="McKinney, David" userId="S::kqkh779@astrazeneca.net::8b945cb3-78ce-42d7-adc5-b07bab32cd5b" providerId="AD" clId="Web-{A3F1E17F-75AC-45B8-AC87-605E8FE95041}" dt="2020-02-13T11:47:54.303" v="25"/>
-          <ac:picMkLst>
-            <pc:docMk/>
-            <pc:sldMk cId="2819223974" sldId="422"/>
-            <ac:picMk id="6" creationId="{133305DB-CFA2-44BF-8CD9-E123986488B3}"/>
-          </ac:picMkLst>
-        </pc:picChg>
-        <pc:picChg chg="add mod">
-          <ac:chgData name="McKinney, David" userId="S::kqkh779@astrazeneca.net::8b945cb3-78ce-42d7-adc5-b07bab32cd5b" providerId="AD" clId="Web-{A3F1E17F-75AC-45B8-AC87-605E8FE95041}" dt="2020-02-13T11:48:59.943" v="45" actId="1076"/>
-          <ac:picMkLst>
-            <pc:docMk/>
-            <pc:sldMk cId="2819223974" sldId="422"/>
-            <ac:picMk id="9" creationId="{A58C0E81-5A34-4153-B80F-5987F9950C45}"/>
-          </ac:picMkLst>
-        </pc:picChg>
-        <pc:picChg chg="add mod">
-          <ac:chgData name="McKinney, David" userId="S::kqkh779@astrazeneca.net::8b945cb3-78ce-42d7-adc5-b07bab32cd5b" providerId="AD" clId="Web-{A3F1E17F-75AC-45B8-AC87-605E8FE95041}" dt="2020-02-13T11:48:58.022" v="44" actId="1076"/>
-          <ac:picMkLst>
-            <pc:docMk/>
-            <pc:sldMk cId="2819223974" sldId="422"/>
-            <ac:picMk id="11" creationId="{03304E51-3B93-4348-80E7-9A3D07B59455}"/>
-          </ac:picMkLst>
-        </pc:picChg>
-        <pc:picChg chg="del">
-          <ac:chgData name="McKinney, David" userId="S::kqkh779@astrazeneca.net::8b945cb3-78ce-42d7-adc5-b07bab32cd5b" providerId="AD" clId="Web-{A3F1E17F-75AC-45B8-AC87-605E8FE95041}" dt="2020-02-13T11:48:42.537" v="37"/>
-          <ac:picMkLst>
-            <pc:docMk/>
-            <pc:sldMk cId="2819223974" sldId="422"/>
-            <ac:picMk id="1032" creationId="{CC0E1BB1-AC2B-4727-BACD-21A08E047076}"/>
-          </ac:picMkLst>
-        </pc:picChg>
-        <pc:cxnChg chg="del">
-          <ac:chgData name="McKinney, David" userId="S::kqkh779@astrazeneca.net::8b945cb3-78ce-42d7-adc5-b07bab32cd5b" providerId="AD" clId="Web-{A3F1E17F-75AC-45B8-AC87-605E8FE95041}" dt="2020-02-13T11:48:44.584" v="38"/>
-          <ac:cxnSpMkLst>
-            <pc:docMk/>
-            <pc:sldMk cId="2819223974" sldId="422"/>
-            <ac:cxnSpMk id="7" creationId="{94E50603-B748-4EAD-823F-CFC68A339D5B}"/>
-          </ac:cxnSpMkLst>
-        </pc:cxnChg>
-      </pc:sldChg>
-    </pc:docChg>
-  </pc:docChgLst>
-  <pc:docChgLst>
-    <pc:chgData name="McKinney, David" userId="S::kqkh779@astrazeneca.net::8b945cb3-78ce-42d7-adc5-b07bab32cd5b" providerId="AD" clId="Web-{439A5F8D-E2D5-4507-938F-6935057FAB23}"/>
-  </pc:docChgLst>
-  <pc:docChgLst>
-    <pc:chgData name="Whittaker, Ryan" userId="S::kbqc931@astrazeneca.net::873b3a98-b8cc-426f-9da0-8dcfa40dc643" providerId="AD" clId="Web-{73D14E00-AD3D-46DA-9E7A-7DE2ED1212F3}"/>
-  </pc:docChgLst>
-  <pc:docChgLst>
-    <pc:chgData name="Bradley, Sam" userId="f75c196c-0419-4ed7-9101-2e14ae32ff77" providerId="ADAL" clId="{5D539316-6F26-47C3-88B4-BCB4FE4A3E07}"/>
-  </pc:docChgLst>
-  <pc:docChgLst>
-    <pc:chgData name="Whittaker, Ryan" userId="S::kbqc931@astrazeneca.net::873b3a98-b8cc-426f-9da0-8dcfa40dc643" providerId="AD" clId="Web-{5BCDD864-810F-4098-8BF2-8E12CA711862}"/>
-  </pc:docChgLst>
-  <pc:docChgLst>
-    <pc:chgData name="Hargreaves, Tim" userId="90cf5d3a-17ee-49d5-b3bb-4550ca7cb171" providerId="ADAL" clId="{A551ADB2-18BB-4E92-A406-F2675FF4D41A}"/>
-  </pc:docChgLst>
   <pc:docChgLst>
     <pc:chgData name="McKinney, David" userId="8b945cb3-78ce-42d7-adc5-b07bab32cd5b" providerId="ADAL" clId="{10779F69-084B-46DF-8B9A-577A83F6E190}"/>
     <pc:docChg chg="custSel addSld delSld modSld sldOrd">
@@ -735,28 +618,91 @@
     </pc:docChg>
   </pc:docChgLst>
   <pc:docChgLst>
-    <pc:chgData name="McKinney, David" userId="8b945cb3-78ce-42d7-adc5-b07bab32cd5b" providerId="ADAL" clId="{4B50621F-9B5F-4849-8581-C894387D6D49}"/>
-  </pc:docChgLst>
-  <pc:docChgLst>
-    <pc:chgData name="McKinney, David" userId="S::kqkh779@astrazeneca.net::8b945cb3-78ce-42d7-adc5-b07bab32cd5b" providerId="AD" clId="Web-{19ED5777-9461-488C-9C2F-EA5FA8BDDD4A}"/>
-  </pc:docChgLst>
-  <pc:docChgLst>
-    <pc:chgData name="Whittaker, Ryan" userId="S::kbqc931@astrazeneca.net::873b3a98-b8cc-426f-9da0-8dcfa40dc643" providerId="AD" clId="Web-{B64EA736-3A8F-466E-8E47-784F4DEF7478}"/>
-  </pc:docChgLst>
-  <pc:docChgLst>
-    <pc:chgData name="McKinney, David" userId="8b945cb3-78ce-42d7-adc5-b07bab32cd5b" providerId="ADAL" clId="{9603A653-FB5C-458E-AF3B-FE7FDA175610}"/>
-  </pc:docChgLst>
-  <pc:docChgLst>
-    <pc:chgData name="Whittaker, Ryan" userId="S::kbqc931@astrazeneca.net::873b3a98-b8cc-426f-9da0-8dcfa40dc643" providerId="AD" clId="Web-{A49819BF-3708-4E37-B4EC-C9678268031B}"/>
-  </pc:docChgLst>
-  <pc:docChgLst>
-    <pc:chgData name="Whittaker, Ryan" userId="S::kbqc931@astrazeneca.net::873b3a98-b8cc-426f-9da0-8dcfa40dc643" providerId="AD" clId="Web-{DCB56511-3446-40CF-BFF7-5E04E04BE463}"/>
-  </pc:docChgLst>
-  <pc:docChgLst>
-    <pc:chgData name="Whittaker, Ryan" userId="S::kbqc931@astrazeneca.net::873b3a98-b8cc-426f-9da0-8dcfa40dc643" providerId="AD" clId="Web-{9A42D76C-D160-41CA-9A1F-C4FC95B41C8B}"/>
-  </pc:docChgLst>
-  <pc:docChgLst>
-    <pc:chgData name="McKinney, David" userId="S::kqkh779@astrazeneca.net::8b945cb3-78ce-42d7-adc5-b07bab32cd5b" providerId="AD" clId="Web-{644B498D-08F7-481A-98FA-B2675B8104AA}"/>
+    <pc:chgData name="McKinney, David" userId="S::kqkh779@astrazeneca.net::8b945cb3-78ce-42d7-adc5-b07bab32cd5b" providerId="AD" clId="Web-{A3F1E17F-75AC-45B8-AC87-605E8FE95041}"/>
+    <pc:docChg chg="addSld modSld">
+      <pc:chgData name="McKinney, David" userId="S::kqkh779@astrazeneca.net::8b945cb3-78ce-42d7-adc5-b07bab32cd5b" providerId="AD" clId="Web-{A3F1E17F-75AC-45B8-AC87-605E8FE95041}" dt="2020-02-13T11:48:59.943" v="45" actId="1076"/>
+      <pc:docMkLst>
+        <pc:docMk/>
+      </pc:docMkLst>
+      <pc:sldChg chg="modSp">
+        <pc:chgData name="McKinney, David" userId="S::kqkh779@astrazeneca.net::8b945cb3-78ce-42d7-adc5-b07bab32cd5b" providerId="AD" clId="Web-{A3F1E17F-75AC-45B8-AC87-605E8FE95041}" dt="2020-02-13T11:45:09.740" v="21" actId="20577"/>
+        <pc:sldMkLst>
+          <pc:docMk/>
+          <pc:sldMk cId="2499478442" sldId="365"/>
+        </pc:sldMkLst>
+        <pc:spChg chg="mod">
+          <ac:chgData name="McKinney, David" userId="S::kqkh779@astrazeneca.net::8b945cb3-78ce-42d7-adc5-b07bab32cd5b" providerId="AD" clId="Web-{A3F1E17F-75AC-45B8-AC87-605E8FE95041}" dt="2020-02-13T11:45:09.740" v="21" actId="20577"/>
+          <ac:spMkLst>
+            <pc:docMk/>
+            <pc:sldMk cId="2499478442" sldId="365"/>
+            <ac:spMk id="3" creationId="{D9F59F0A-AA59-4F15-95CC-124F6F55180D}"/>
+          </ac:spMkLst>
+        </pc:spChg>
+      </pc:sldChg>
+      <pc:sldChg chg="addSp delSp modSp add replId">
+        <pc:chgData name="McKinney, David" userId="S::kqkh779@astrazeneca.net::8b945cb3-78ce-42d7-adc5-b07bab32cd5b" providerId="AD" clId="Web-{A3F1E17F-75AC-45B8-AC87-605E8FE95041}" dt="2020-02-13T11:48:59.943" v="45" actId="1076"/>
+        <pc:sldMkLst>
+          <pc:docMk/>
+          <pc:sldMk cId="2819223974" sldId="422"/>
+        </pc:sldMkLst>
+        <pc:spChg chg="mod">
+          <ac:chgData name="McKinney, David" userId="S::kqkh779@astrazeneca.net::8b945cb3-78ce-42d7-adc5-b07bab32cd5b" providerId="AD" clId="Web-{A3F1E17F-75AC-45B8-AC87-605E8FE95041}" dt="2020-02-13T11:45:14.911" v="23" actId="20577"/>
+          <ac:spMkLst>
+            <pc:docMk/>
+            <pc:sldMk cId="2819223974" sldId="422"/>
+            <ac:spMk id="3" creationId="{D9F59F0A-AA59-4F15-95CC-124F6F55180D}"/>
+          </ac:spMkLst>
+        </pc:spChg>
+        <pc:picChg chg="del">
+          <ac:chgData name="McKinney, David" userId="S::kqkh779@astrazeneca.net::8b945cb3-78ce-42d7-adc5-b07bab32cd5b" providerId="AD" clId="Web-{A3F1E17F-75AC-45B8-AC87-605E8FE95041}" dt="2020-02-13T11:48:40.850" v="36"/>
+          <ac:picMkLst>
+            <pc:docMk/>
+            <pc:sldMk cId="2819223974" sldId="422"/>
+            <ac:picMk id="5" creationId="{EB4C028F-E23D-4091-962F-46D6A6A0B8A1}"/>
+          </ac:picMkLst>
+        </pc:picChg>
+        <pc:picChg chg="add del mod">
+          <ac:chgData name="McKinney, David" userId="S::kqkh779@astrazeneca.net::8b945cb3-78ce-42d7-adc5-b07bab32cd5b" providerId="AD" clId="Web-{A3F1E17F-75AC-45B8-AC87-605E8FE95041}" dt="2020-02-13T11:47:54.303" v="25"/>
+          <ac:picMkLst>
+            <pc:docMk/>
+            <pc:sldMk cId="2819223974" sldId="422"/>
+            <ac:picMk id="6" creationId="{133305DB-CFA2-44BF-8CD9-E123986488B3}"/>
+          </ac:picMkLst>
+        </pc:picChg>
+        <pc:picChg chg="add mod">
+          <ac:chgData name="McKinney, David" userId="S::kqkh779@astrazeneca.net::8b945cb3-78ce-42d7-adc5-b07bab32cd5b" providerId="AD" clId="Web-{A3F1E17F-75AC-45B8-AC87-605E8FE95041}" dt="2020-02-13T11:48:59.943" v="45" actId="1076"/>
+          <ac:picMkLst>
+            <pc:docMk/>
+            <pc:sldMk cId="2819223974" sldId="422"/>
+            <ac:picMk id="9" creationId="{A58C0E81-5A34-4153-B80F-5987F9950C45}"/>
+          </ac:picMkLst>
+        </pc:picChg>
+        <pc:picChg chg="add mod">
+          <ac:chgData name="McKinney, David" userId="S::kqkh779@astrazeneca.net::8b945cb3-78ce-42d7-adc5-b07bab32cd5b" providerId="AD" clId="Web-{A3F1E17F-75AC-45B8-AC87-605E8FE95041}" dt="2020-02-13T11:48:58.022" v="44" actId="1076"/>
+          <ac:picMkLst>
+            <pc:docMk/>
+            <pc:sldMk cId="2819223974" sldId="422"/>
+            <ac:picMk id="11" creationId="{03304E51-3B93-4348-80E7-9A3D07B59455}"/>
+          </ac:picMkLst>
+        </pc:picChg>
+        <pc:picChg chg="del">
+          <ac:chgData name="McKinney, David" userId="S::kqkh779@astrazeneca.net::8b945cb3-78ce-42d7-adc5-b07bab32cd5b" providerId="AD" clId="Web-{A3F1E17F-75AC-45B8-AC87-605E8FE95041}" dt="2020-02-13T11:48:42.537" v="37"/>
+          <ac:picMkLst>
+            <pc:docMk/>
+            <pc:sldMk cId="2819223974" sldId="422"/>
+            <ac:picMk id="1032" creationId="{CC0E1BB1-AC2B-4727-BACD-21A08E047076}"/>
+          </ac:picMkLst>
+        </pc:picChg>
+        <pc:cxnChg chg="del">
+          <ac:chgData name="McKinney, David" userId="S::kqkh779@astrazeneca.net::8b945cb3-78ce-42d7-adc5-b07bab32cd5b" providerId="AD" clId="Web-{A3F1E17F-75AC-45B8-AC87-605E8FE95041}" dt="2020-02-13T11:48:44.584" v="38"/>
+          <ac:cxnSpMkLst>
+            <pc:docMk/>
+            <pc:sldMk cId="2819223974" sldId="422"/>
+            <ac:cxnSpMk id="7" creationId="{94E50603-B748-4EAD-823F-CFC68A339D5B}"/>
+          </ac:cxnSpMkLst>
+        </pc:cxnChg>
+      </pc:sldChg>
+    </pc:docChg>
   </pc:docChgLst>
 </pc:chgInfo>
 </file>
@@ -844,7 +790,7 @@
             <a:fld id="{3BBED7E8-0829-F34C-B479-A757805E6C1B}" type="datetimeFigureOut">
               <a:rPr lang="en-US" smtClean="0"/>
               <a:pPr/>
-              <a:t>4/3/2020</a:t>
+              <a:t>3/25/2021</a:t>
             </a:fld>
             <a:endParaRPr lang="en-US"/>
           </a:p>
@@ -1012,7 +958,7 @@
             <a:fld id="{6C7E4F11-7667-5045-A00B-01970EA44BB5}" type="datetimeFigureOut">
               <a:rPr lang="en-US" smtClean="0"/>
               <a:pPr/>
-              <a:t>4/3/2020</a:t>
+              <a:t>3/25/2021</a:t>
             </a:fld>
             <a:endParaRPr lang="en-US"/>
           </a:p>
@@ -28782,7 +28728,7 @@
                 <a:latin typeface="Arial"/>
                 <a:cs typeface="Arial"/>
               </a:rPr>
-              <a:t>Summation is the only thing we can do with lists</a:t>
+              <a:t>Summation is not the only thing we can do with lists</a:t>
             </a:r>
           </a:p>
           <a:p>
@@ -35745,6 +35691,11 @@
 
 <file path=customXml/item1.xml><?xml version="1.0" encoding="utf-8"?>
 <?mso-contentType ?>
+<SharedContentType xmlns="Microsoft.SharePoint.Taxonomy.ContentTypeSync" SourceId="1ee89e71-04cd-405e-9ca3-99e020c1694d" ContentTypeId="0x0101" PreviousValue="false"/>
+</file>
+
+<file path=customXml/item2.xml><?xml version="1.0" encoding="utf-8"?>
+<?mso-contentType ?>
 <FormTemplates xmlns="http://schemas.microsoft.com/sharepoint/v3/contenttype/forms">
   <Display>DocumentLibraryForm</Display>
   <Edit>DocumentLibraryForm</Edit>
@@ -35752,12 +35703,16 @@
 </FormTemplates>
 </file>
 
-<file path=customXml/item2.xml><?xml version="1.0" encoding="utf-8"?>
-<?mso-contentType ?>
-<SharedContentType xmlns="Microsoft.SharePoint.Taxonomy.ContentTypeSync" SourceId="1ee89e71-04cd-405e-9ca3-99e020c1694d" ContentTypeId="0x0101" PreviousValue="false"/>
+<file path=customXml/item3.xml><?xml version="1.0" encoding="utf-8"?>
+<p:properties xmlns:p="http://schemas.microsoft.com/office/2006/metadata/properties" xmlns:xsi="http://www.w3.org/2001/XMLSchema-instance" xmlns:pc="http://schemas.microsoft.com/office/infopath/2007/PartnerControls">
+  <documentManagement>
+    <Keyword xmlns="44a56295-c29e-4898-8136-a54736c65b82" xsi:nil="true"/>
+    <Descriptions xmlns="44a56295-c29e-4898-8136-a54736c65b82" xsi:nil="true"/>
+  </documentManagement>
+</p:properties>
 </file>
 
-<file path=customXml/item3.xml><?xml version="1.0" encoding="utf-8"?>
+<file path=customXml/item4.xml><?xml version="1.0" encoding="utf-8"?>
 <ct:contentTypeSchema xmlns:ct="http://schemas.microsoft.com/office/2006/metadata/contentType" xmlns:ma="http://schemas.microsoft.com/office/2006/metadata/properties/metaAttributes" ct:_="" ma:_="" ma:contentTypeName="Document" ma:contentTypeID="0x010100C9F3DD611966374C9EAA8DC5A2F94CD8" ma:contentTypeVersion="8" ma:contentTypeDescription="Create a new document." ma:contentTypeScope="" ma:versionID="18a8759320524e51783f13c6663a10d1">
   <xsd:schema xmlns:xsd="http://www.w3.org/2001/XMLSchema" xmlns:xs="http://www.w3.org/2001/XMLSchema" xmlns:p="http://schemas.microsoft.com/office/2006/metadata/properties" xmlns:ns2="44a56295-c29e-4898-8136-a54736c65b82" xmlns:ns3="9675ef8f-b755-4cd6-a742-8cae3d86c4fe" targetNamespace="http://schemas.microsoft.com/office/2006/metadata/properties" ma:root="true" ma:fieldsID="1b693415669a5bc10d56a9234ce5202b" ns2:_="" ns3:_="">
     <xsd:import namespace="44a56295-c29e-4898-8136-a54736c65b82"/>
@@ -35936,16 +35891,15 @@
 </ct:contentTypeSchema>
 </file>
 
-<file path=customXml/item4.xml><?xml version="1.0" encoding="utf-8"?>
-<p:properties xmlns:p="http://schemas.microsoft.com/office/2006/metadata/properties" xmlns:xsi="http://www.w3.org/2001/XMLSchema-instance" xmlns:pc="http://schemas.microsoft.com/office/infopath/2007/PartnerControls">
-  <documentManagement>
-    <Keyword xmlns="44a56295-c29e-4898-8136-a54736c65b82" xsi:nil="true"/>
-    <Descriptions xmlns="44a56295-c29e-4898-8136-a54736c65b82" xsi:nil="true"/>
-  </documentManagement>
-</p:properties>
+<file path=customXml/itemProps1.xml><?xml version="1.0" encoding="utf-8"?>
+<ds:datastoreItem xmlns:ds="http://schemas.openxmlformats.org/officeDocument/2006/customXml" ds:itemID="{3D9D9437-4660-4E6E-9349-9C8386915BD1}">
+  <ds:schemaRefs>
+    <ds:schemaRef ds:uri="Microsoft.SharePoint.Taxonomy.ContentTypeSync"/>
+  </ds:schemaRefs>
+</ds:datastoreItem>
 </file>
 
-<file path=customXml/itemProps1.xml><?xml version="1.0" encoding="utf-8"?>
+<file path=customXml/itemProps2.xml><?xml version="1.0" encoding="utf-8"?>
 <ds:datastoreItem xmlns:ds="http://schemas.openxmlformats.org/officeDocument/2006/customXml" ds:itemID="{CCB085B9-8EF5-4B2C-B089-029492EC23AC}">
   <ds:schemaRefs>
     <ds:schemaRef ds:uri="http://schemas.microsoft.com/sharepoint/v3/contenttype/forms"/>
@@ -35953,15 +35907,24 @@
 </ds:datastoreItem>
 </file>
 
-<file path=customXml/itemProps2.xml><?xml version="1.0" encoding="utf-8"?>
-<ds:datastoreItem xmlns:ds="http://schemas.openxmlformats.org/officeDocument/2006/customXml" ds:itemID="{3D9D9437-4660-4E6E-9349-9C8386915BD1}">
+<file path=customXml/itemProps3.xml><?xml version="1.0" encoding="utf-8"?>
+<ds:datastoreItem xmlns:ds="http://schemas.openxmlformats.org/officeDocument/2006/customXml" ds:itemID="{8E7055A9-979E-42E4-8AE4-11D4A57371C1}">
   <ds:schemaRefs>
-    <ds:schemaRef ds:uri="Microsoft.SharePoint.Taxonomy.ContentTypeSync"/>
+    <ds:schemaRef ds:uri="http://purl.org/dc/terms/"/>
+    <ds:schemaRef ds:uri="9675ef8f-b755-4cd6-a742-8cae3d86c4fe"/>
+    <ds:schemaRef ds:uri="http://schemas.microsoft.com/office/2006/documentManagement/types"/>
+    <ds:schemaRef ds:uri="http://schemas.openxmlformats.org/package/2006/metadata/core-properties"/>
+    <ds:schemaRef ds:uri="http://purl.org/dc/elements/1.1/"/>
+    <ds:schemaRef ds:uri="http://schemas.microsoft.com/office/2006/metadata/properties"/>
+    <ds:schemaRef ds:uri="44a56295-c29e-4898-8136-a54736c65b82"/>
+    <ds:schemaRef ds:uri="http://schemas.microsoft.com/office/infopath/2007/PartnerControls"/>
+    <ds:schemaRef ds:uri="http://www.w3.org/XML/1998/namespace"/>
+    <ds:schemaRef ds:uri="http://purl.org/dc/dcmitype/"/>
   </ds:schemaRefs>
 </ds:datastoreItem>
 </file>
 
-<file path=customXml/itemProps3.xml><?xml version="1.0" encoding="utf-8"?>
+<file path=customXml/itemProps4.xml><?xml version="1.0" encoding="utf-8"?>
 <ds:datastoreItem xmlns:ds="http://schemas.openxmlformats.org/officeDocument/2006/customXml" ds:itemID="{0B5CDA7F-D407-42B2-AFFC-685DACC4A847}">
   <ds:schemaRefs>
     <ds:schemaRef ds:uri="http://schemas.microsoft.com/office/2006/metadata/contentType"/>
@@ -35978,21 +35941,4 @@
     <ds:schemaRef ds:uri="http://schemas.microsoft.com/internal/obd"/>
   </ds:schemaRefs>
 </ds:datastoreItem>
-</file>
-
-<file path=customXml/itemProps4.xml><?xml version="1.0" encoding="utf-8"?>
-<ds:datastoreItem xmlns:ds="http://schemas.openxmlformats.org/officeDocument/2006/customXml" ds:itemID="{8E7055A9-979E-42E4-8AE4-11D4A57371C1}">
-  <ds:schemaRefs>
-    <ds:schemaRef ds:uri="http://purl.org/dc/terms/"/>
-    <ds:schemaRef ds:uri="9675ef8f-b755-4cd6-a742-8cae3d86c4fe"/>
-    <ds:schemaRef ds:uri="http://schemas.microsoft.com/office/2006/documentManagement/types"/>
-    <ds:schemaRef ds:uri="http://schemas.openxmlformats.org/package/2006/metadata/core-properties"/>
-    <ds:schemaRef ds:uri="http://purl.org/dc/elements/1.1/"/>
-    <ds:schemaRef ds:uri="http://schemas.microsoft.com/office/2006/metadata/properties"/>
-    <ds:schemaRef ds:uri="44a56295-c29e-4898-8136-a54736c65b82"/>
-    <ds:schemaRef ds:uri="http://schemas.microsoft.com/office/infopath/2007/PartnerControls"/>
-    <ds:schemaRef ds:uri="http://www.w3.org/XML/1998/namespace"/>
-    <ds:schemaRef ds:uri="http://purl.org/dc/dcmitype/"/>
-  </ds:schemaRefs>
-</ds:datastoreItem>
 </file>
</xml_diff>

<commit_message>
Updated session 2 slide deck
Mostly style updates (slimmed down text, increased line spacing, highlighted key new concepts)
</commit_message>
<xml_diff>
--- a/session_two/session_two_presentation.pptx
+++ b/session_two/session_two_presentation.pptx
@@ -8,15 +8,15 @@
     <p:sldMasterId id="2147483656" r:id="rId8"/>
   </p:sldMasterIdLst>
   <p:notesMasterIdLst>
-    <p:notesMasterId r:id="rId30"/>
+    <p:notesMasterId r:id="rId31"/>
   </p:notesMasterIdLst>
   <p:handoutMasterIdLst>
-    <p:handoutMasterId r:id="rId31"/>
+    <p:handoutMasterId r:id="rId32"/>
   </p:handoutMasterIdLst>
   <p:sldIdLst>
     <p:sldId id="359" r:id="rId9"/>
-    <p:sldId id="422" r:id="rId10"/>
-    <p:sldId id="439" r:id="rId11"/>
+    <p:sldId id="439" r:id="rId10"/>
+    <p:sldId id="422" r:id="rId11"/>
     <p:sldId id="365" r:id="rId12"/>
     <p:sldId id="423" r:id="rId13"/>
     <p:sldId id="424" r:id="rId14"/>
@@ -35,11 +35,12 @@
     <p:sldId id="435" r:id="rId27"/>
     <p:sldId id="436" r:id="rId28"/>
     <p:sldId id="437" r:id="rId29"/>
+    <p:sldId id="440" r:id="rId30"/>
   </p:sldIdLst>
   <p:sldSz cx="9144000" cy="5143500" type="screen16x9"/>
   <p:notesSz cx="6670675" cy="9875838"/>
   <p:custDataLst>
-    <p:tags r:id="rId32"/>
+    <p:tags r:id="rId33"/>
   </p:custDataLst>
   <p:defaultTextStyle>
     <a:defPPr>
@@ -177,14 +178,691 @@
 <file path=ppt/revisionInfo.xml><?xml version="1.0" encoding="utf-8"?>
 <p1510:revInfo xmlns:a="http://schemas.openxmlformats.org/drawingml/2006/main" xmlns:r="http://schemas.openxmlformats.org/officeDocument/2006/relationships" xmlns:p1510="http://schemas.microsoft.com/office/powerpoint/2015/10/main">
   <p1510:revLst>
-    <p1510:client id="{10779F69-084B-46DF-8B9A-577A83F6E190}" v="745" dt="2020-02-13T11:53:28.123"/>
-    <p1510:client id="{A3F1E17F-75AC-45B8-AC87-605E8FE95041}" v="49" dt="2020-02-13T11:48:59.943"/>
+    <p1510:client id="{5187E7B3-9ACA-49E3-A656-FF3AA81F6BB4}" v="78" dt="2024-03-12T10:05:49.058"/>
   </p1510:revLst>
 </p1510:revInfo>
 </file>
 
 <file path=ppt/changesInfos/changesInfo1.xml><?xml version="1.0" encoding="utf-8"?>
 <pc:chgInfo xmlns:a="http://schemas.openxmlformats.org/drawingml/2006/main" xmlns:r="http://schemas.openxmlformats.org/officeDocument/2006/relationships" xmlns:ac="http://schemas.microsoft.com/office/drawing/2013/main/command" xmlns:pc="http://schemas.microsoft.com/office/powerpoint/2013/main/command">
+  <pc:docChgLst>
+    <pc:chgData name="Francescatto, Margherita" userId="8dce2127-3ed7-41e9-a69d-639dab6d0671" providerId="ADAL" clId="{5187E7B3-9ACA-49E3-A656-FF3AA81F6BB4}"/>
+    <pc:docChg chg="undo custSel addSld delSld modSld sldOrd">
+      <pc:chgData name="Francescatto, Margherita" userId="8dce2127-3ed7-41e9-a69d-639dab6d0671" providerId="ADAL" clId="{5187E7B3-9ACA-49E3-A656-FF3AA81F6BB4}" dt="2024-03-12T10:05:49.058" v="866"/>
+      <pc:docMkLst>
+        <pc:docMk/>
+      </pc:docMkLst>
+      <pc:sldChg chg="modSp">
+        <pc:chgData name="Francescatto, Margherita" userId="8dce2127-3ed7-41e9-a69d-639dab6d0671" providerId="ADAL" clId="{5187E7B3-9ACA-49E3-A656-FF3AA81F6BB4}" dt="2024-03-12T10:05:49.058" v="866"/>
+        <pc:sldMkLst>
+          <pc:docMk/>
+          <pc:sldMk cId="211931337" sldId="359"/>
+        </pc:sldMkLst>
+        <pc:spChg chg="mod">
+          <ac:chgData name="Francescatto, Margherita" userId="8dce2127-3ed7-41e9-a69d-639dab6d0671" providerId="ADAL" clId="{5187E7B3-9ACA-49E3-A656-FF3AA81F6BB4}" dt="2024-03-12T10:00:17.795" v="699"/>
+          <ac:spMkLst>
+            <pc:docMk/>
+            <pc:sldMk cId="211931337" sldId="359"/>
+            <ac:spMk id="16" creationId="{B5575085-1C13-4A80-86E1-DDE70BEA5456}"/>
+          </ac:spMkLst>
+        </pc:spChg>
+        <pc:spChg chg="mod">
+          <ac:chgData name="Francescatto, Margherita" userId="8dce2127-3ed7-41e9-a69d-639dab6d0671" providerId="ADAL" clId="{5187E7B3-9ACA-49E3-A656-FF3AA81F6BB4}" dt="2024-03-12T10:05:49.058" v="866"/>
+          <ac:spMkLst>
+            <pc:docMk/>
+            <pc:sldMk cId="211931337" sldId="359"/>
+            <ac:spMk id="17" creationId="{8683B839-408B-4D3A-9561-0775ABDD02AB}"/>
+          </ac:spMkLst>
+        </pc:spChg>
+      </pc:sldChg>
+      <pc:sldChg chg="modSp mod">
+        <pc:chgData name="Francescatto, Margherita" userId="8dce2127-3ed7-41e9-a69d-639dab6d0671" providerId="ADAL" clId="{5187E7B3-9ACA-49E3-A656-FF3AA81F6BB4}" dt="2024-03-12T09:34:45.332" v="173" actId="20577"/>
+        <pc:sldMkLst>
+          <pc:docMk/>
+          <pc:sldMk cId="2499478442" sldId="365"/>
+        </pc:sldMkLst>
+        <pc:spChg chg="mod">
+          <ac:chgData name="Francescatto, Margherita" userId="8dce2127-3ed7-41e9-a69d-639dab6d0671" providerId="ADAL" clId="{5187E7B3-9ACA-49E3-A656-FF3AA81F6BB4}" dt="2024-03-12T09:34:45.332" v="173" actId="20577"/>
+          <ac:spMkLst>
+            <pc:docMk/>
+            <pc:sldMk cId="2499478442" sldId="365"/>
+            <ac:spMk id="9" creationId="{EFADBC8D-294D-4832-A9A1-5CC2FA0C5801}"/>
+          </ac:spMkLst>
+        </pc:spChg>
+      </pc:sldChg>
+      <pc:sldChg chg="modSp mod">
+        <pc:chgData name="Francescatto, Margherita" userId="8dce2127-3ed7-41e9-a69d-639dab6d0671" providerId="ADAL" clId="{5187E7B3-9ACA-49E3-A656-FF3AA81F6BB4}" dt="2024-03-12T09:46:52.010" v="271" actId="948"/>
+        <pc:sldMkLst>
+          <pc:docMk/>
+          <pc:sldMk cId="1842913658" sldId="400"/>
+        </pc:sldMkLst>
+        <pc:spChg chg="mod">
+          <ac:chgData name="Francescatto, Margherita" userId="8dce2127-3ed7-41e9-a69d-639dab6d0671" providerId="ADAL" clId="{5187E7B3-9ACA-49E3-A656-FF3AA81F6BB4}" dt="2024-03-12T09:46:52.010" v="271" actId="948"/>
+          <ac:spMkLst>
+            <pc:docMk/>
+            <pc:sldMk cId="1842913658" sldId="400"/>
+            <ac:spMk id="9" creationId="{BECFC77B-6DD8-4F54-8E01-9C253CB35BC4}"/>
+          </ac:spMkLst>
+        </pc:spChg>
+      </pc:sldChg>
+      <pc:sldChg chg="modSp mod">
+        <pc:chgData name="Francescatto, Margherita" userId="8dce2127-3ed7-41e9-a69d-639dab6d0671" providerId="ADAL" clId="{5187E7B3-9ACA-49E3-A656-FF3AA81F6BB4}" dt="2024-03-12T09:34:27.703" v="165" actId="113"/>
+        <pc:sldMkLst>
+          <pc:docMk/>
+          <pc:sldMk cId="2463318137" sldId="422"/>
+        </pc:sldMkLst>
+        <pc:spChg chg="mod">
+          <ac:chgData name="Francescatto, Margherita" userId="8dce2127-3ed7-41e9-a69d-639dab6d0671" providerId="ADAL" clId="{5187E7B3-9ACA-49E3-A656-FF3AA81F6BB4}" dt="2024-03-12T09:34:27.703" v="165" actId="113"/>
+          <ac:spMkLst>
+            <pc:docMk/>
+            <pc:sldMk cId="2463318137" sldId="422"/>
+            <ac:spMk id="11" creationId="{825EE2FD-D59C-4D6F-93E9-415E324D68C1}"/>
+          </ac:spMkLst>
+        </pc:spChg>
+      </pc:sldChg>
+      <pc:sldChg chg="modSp mod">
+        <pc:chgData name="Francescatto, Margherita" userId="8dce2127-3ed7-41e9-a69d-639dab6d0671" providerId="ADAL" clId="{5187E7B3-9ACA-49E3-A656-FF3AA81F6BB4}" dt="2024-03-12T09:56:28.726" v="643" actId="313"/>
+        <pc:sldMkLst>
+          <pc:docMk/>
+          <pc:sldMk cId="3446684734" sldId="423"/>
+        </pc:sldMkLst>
+        <pc:spChg chg="mod">
+          <ac:chgData name="Francescatto, Margherita" userId="8dce2127-3ed7-41e9-a69d-639dab6d0671" providerId="ADAL" clId="{5187E7B3-9ACA-49E3-A656-FF3AA81F6BB4}" dt="2024-03-12T09:56:28.726" v="643" actId="313"/>
+          <ac:spMkLst>
+            <pc:docMk/>
+            <pc:sldMk cId="3446684734" sldId="423"/>
+            <ac:spMk id="11" creationId="{825EE2FD-D59C-4D6F-93E9-415E324D68C1}"/>
+          </ac:spMkLst>
+        </pc:spChg>
+        <pc:picChg chg="mod">
+          <ac:chgData name="Francescatto, Margherita" userId="8dce2127-3ed7-41e9-a69d-639dab6d0671" providerId="ADAL" clId="{5187E7B3-9ACA-49E3-A656-FF3AA81F6BB4}" dt="2024-03-12T09:54:55.137" v="531" actId="1036"/>
+          <ac:picMkLst>
+            <pc:docMk/>
+            <pc:sldMk cId="3446684734" sldId="423"/>
+            <ac:picMk id="8" creationId="{43E0259C-FAD6-433C-AC1B-EAB7C218487E}"/>
+          </ac:picMkLst>
+        </pc:picChg>
+      </pc:sldChg>
+      <pc:sldChg chg="modSp mod">
+        <pc:chgData name="Francescatto, Margherita" userId="8dce2127-3ed7-41e9-a69d-639dab6d0671" providerId="ADAL" clId="{5187E7B3-9ACA-49E3-A656-FF3AA81F6BB4}" dt="2024-03-12T09:35:31.242" v="180" actId="20577"/>
+        <pc:sldMkLst>
+          <pc:docMk/>
+          <pc:sldMk cId="477257485" sldId="424"/>
+        </pc:sldMkLst>
+        <pc:spChg chg="mod">
+          <ac:chgData name="Francescatto, Margherita" userId="8dce2127-3ed7-41e9-a69d-639dab6d0671" providerId="ADAL" clId="{5187E7B3-9ACA-49E3-A656-FF3AA81F6BB4}" dt="2024-03-12T09:35:31.242" v="180" actId="20577"/>
+          <ac:spMkLst>
+            <pc:docMk/>
+            <pc:sldMk cId="477257485" sldId="424"/>
+            <ac:spMk id="11" creationId="{825EE2FD-D59C-4D6F-93E9-415E324D68C1}"/>
+          </ac:spMkLst>
+        </pc:spChg>
+      </pc:sldChg>
+      <pc:sldChg chg="modSp mod">
+        <pc:chgData name="Francescatto, Margherita" userId="8dce2127-3ed7-41e9-a69d-639dab6d0671" providerId="ADAL" clId="{5187E7B3-9ACA-49E3-A656-FF3AA81F6BB4}" dt="2024-03-12T09:45:00.210" v="262" actId="20577"/>
+        <pc:sldMkLst>
+          <pc:docMk/>
+          <pc:sldMk cId="288644712" sldId="425"/>
+        </pc:sldMkLst>
+        <pc:spChg chg="mod">
+          <ac:chgData name="Francescatto, Margherita" userId="8dce2127-3ed7-41e9-a69d-639dab6d0671" providerId="ADAL" clId="{5187E7B3-9ACA-49E3-A656-FF3AA81F6BB4}" dt="2024-03-12T09:45:00.210" v="262" actId="20577"/>
+          <ac:spMkLst>
+            <pc:docMk/>
+            <pc:sldMk cId="288644712" sldId="425"/>
+            <ac:spMk id="11" creationId="{825EE2FD-D59C-4D6F-93E9-415E324D68C1}"/>
+          </ac:spMkLst>
+        </pc:spChg>
+      </pc:sldChg>
+      <pc:sldChg chg="modSp mod">
+        <pc:chgData name="Francescatto, Margherita" userId="8dce2127-3ed7-41e9-a69d-639dab6d0671" providerId="ADAL" clId="{5187E7B3-9ACA-49E3-A656-FF3AA81F6BB4}" dt="2024-03-12T09:46:21.582" v="270" actId="948"/>
+        <pc:sldMkLst>
+          <pc:docMk/>
+          <pc:sldMk cId="16827821" sldId="426"/>
+        </pc:sldMkLst>
+        <pc:spChg chg="mod">
+          <ac:chgData name="Francescatto, Margherita" userId="8dce2127-3ed7-41e9-a69d-639dab6d0671" providerId="ADAL" clId="{5187E7B3-9ACA-49E3-A656-FF3AA81F6BB4}" dt="2024-03-12T09:46:21.582" v="270" actId="948"/>
+          <ac:spMkLst>
+            <pc:docMk/>
+            <pc:sldMk cId="16827821" sldId="426"/>
+            <ac:spMk id="8" creationId="{02F09C7E-2B29-47F4-BC2B-2A460EB7D7D0}"/>
+          </ac:spMkLst>
+        </pc:spChg>
+      </pc:sldChg>
+      <pc:sldChg chg="modSp mod">
+        <pc:chgData name="Francescatto, Margherita" userId="8dce2127-3ed7-41e9-a69d-639dab6d0671" providerId="ADAL" clId="{5187E7B3-9ACA-49E3-A656-FF3AA81F6BB4}" dt="2024-03-12T09:47:37.779" v="279" actId="948"/>
+        <pc:sldMkLst>
+          <pc:docMk/>
+          <pc:sldMk cId="4188554324" sldId="427"/>
+        </pc:sldMkLst>
+        <pc:spChg chg="mod">
+          <ac:chgData name="Francescatto, Margherita" userId="8dce2127-3ed7-41e9-a69d-639dab6d0671" providerId="ADAL" clId="{5187E7B3-9ACA-49E3-A656-FF3AA81F6BB4}" dt="2024-03-12T09:47:37.779" v="279" actId="948"/>
+          <ac:spMkLst>
+            <pc:docMk/>
+            <pc:sldMk cId="4188554324" sldId="427"/>
+            <ac:spMk id="9" creationId="{BECFC77B-6DD8-4F54-8E01-9C253CB35BC4}"/>
+          </ac:spMkLst>
+        </pc:spChg>
+      </pc:sldChg>
+      <pc:sldChg chg="modSp mod">
+        <pc:chgData name="Francescatto, Margherita" userId="8dce2127-3ed7-41e9-a69d-639dab6d0671" providerId="ADAL" clId="{5187E7B3-9ACA-49E3-A656-FF3AA81F6BB4}" dt="2024-03-12T09:54:15.787" v="510" actId="113"/>
+        <pc:sldMkLst>
+          <pc:docMk/>
+          <pc:sldMk cId="2567102348" sldId="428"/>
+        </pc:sldMkLst>
+        <pc:spChg chg="mod">
+          <ac:chgData name="Francescatto, Margherita" userId="8dce2127-3ed7-41e9-a69d-639dab6d0671" providerId="ADAL" clId="{5187E7B3-9ACA-49E3-A656-FF3AA81F6BB4}" dt="2024-03-12T09:54:15.787" v="510" actId="113"/>
+          <ac:spMkLst>
+            <pc:docMk/>
+            <pc:sldMk cId="2567102348" sldId="428"/>
+            <ac:spMk id="9" creationId="{BECFC77B-6DD8-4F54-8E01-9C253CB35BC4}"/>
+          </ac:spMkLst>
+        </pc:spChg>
+        <pc:picChg chg="mod">
+          <ac:chgData name="Francescatto, Margherita" userId="8dce2127-3ed7-41e9-a69d-639dab6d0671" providerId="ADAL" clId="{5187E7B3-9ACA-49E3-A656-FF3AA81F6BB4}" dt="2024-03-12T09:50:11.610" v="401" actId="1076"/>
+          <ac:picMkLst>
+            <pc:docMk/>
+            <pc:sldMk cId="2567102348" sldId="428"/>
+            <ac:picMk id="6" creationId="{14E2F2CC-87F0-4D86-B46B-D50EF938B590}"/>
+          </ac:picMkLst>
+        </pc:picChg>
+      </pc:sldChg>
+      <pc:sldChg chg="modSp mod">
+        <pc:chgData name="Francescatto, Margherita" userId="8dce2127-3ed7-41e9-a69d-639dab6d0671" providerId="ADAL" clId="{5187E7B3-9ACA-49E3-A656-FF3AA81F6BB4}" dt="2024-03-12T09:50:59.797" v="437" actId="948"/>
+        <pc:sldMkLst>
+          <pc:docMk/>
+          <pc:sldMk cId="1905142422" sldId="429"/>
+        </pc:sldMkLst>
+        <pc:spChg chg="mod">
+          <ac:chgData name="Francescatto, Margherita" userId="8dce2127-3ed7-41e9-a69d-639dab6d0671" providerId="ADAL" clId="{5187E7B3-9ACA-49E3-A656-FF3AA81F6BB4}" dt="2024-03-12T09:50:59.797" v="437" actId="948"/>
+          <ac:spMkLst>
+            <pc:docMk/>
+            <pc:sldMk cId="1905142422" sldId="429"/>
+            <ac:spMk id="9" creationId="{BECFC77B-6DD8-4F54-8E01-9C253CB35BC4}"/>
+          </ac:spMkLst>
+        </pc:spChg>
+      </pc:sldChg>
+      <pc:sldChg chg="modSp mod">
+        <pc:chgData name="Francescatto, Margherita" userId="8dce2127-3ed7-41e9-a69d-639dab6d0671" providerId="ADAL" clId="{5187E7B3-9ACA-49E3-A656-FF3AA81F6BB4}" dt="2024-03-12T09:54:06.477" v="509" actId="113"/>
+        <pc:sldMkLst>
+          <pc:docMk/>
+          <pc:sldMk cId="1718816784" sldId="431"/>
+        </pc:sldMkLst>
+        <pc:spChg chg="mod">
+          <ac:chgData name="Francescatto, Margherita" userId="8dce2127-3ed7-41e9-a69d-639dab6d0671" providerId="ADAL" clId="{5187E7B3-9ACA-49E3-A656-FF3AA81F6BB4}" dt="2024-03-12T09:54:06.477" v="509" actId="113"/>
+          <ac:spMkLst>
+            <pc:docMk/>
+            <pc:sldMk cId="1718816784" sldId="431"/>
+            <ac:spMk id="9" creationId="{BECFC77B-6DD8-4F54-8E01-9C253CB35BC4}"/>
+          </ac:spMkLst>
+        </pc:spChg>
+        <pc:picChg chg="mod">
+          <ac:chgData name="Francescatto, Margherita" userId="8dce2127-3ed7-41e9-a69d-639dab6d0671" providerId="ADAL" clId="{5187E7B3-9ACA-49E3-A656-FF3AA81F6BB4}" dt="2024-03-12T09:51:36.917" v="463" actId="1036"/>
+          <ac:picMkLst>
+            <pc:docMk/>
+            <pc:sldMk cId="1718816784" sldId="431"/>
+            <ac:picMk id="3" creationId="{59609BFB-29C3-44CE-B142-E3F13990D70D}"/>
+          </ac:picMkLst>
+        </pc:picChg>
+        <pc:picChg chg="mod">
+          <ac:chgData name="Francescatto, Margherita" userId="8dce2127-3ed7-41e9-a69d-639dab6d0671" providerId="ADAL" clId="{5187E7B3-9ACA-49E3-A656-FF3AA81F6BB4}" dt="2024-03-12T09:51:36.917" v="463" actId="1036"/>
+          <ac:picMkLst>
+            <pc:docMk/>
+            <pc:sldMk cId="1718816784" sldId="431"/>
+            <ac:picMk id="5" creationId="{E5B4408C-5D2D-4CD5-96BA-8063EA953EBA}"/>
+          </ac:picMkLst>
+        </pc:picChg>
+        <pc:picChg chg="mod">
+          <ac:chgData name="Francescatto, Margherita" userId="8dce2127-3ed7-41e9-a69d-639dab6d0671" providerId="ADAL" clId="{5187E7B3-9ACA-49E3-A656-FF3AA81F6BB4}" dt="2024-03-12T09:51:36.917" v="463" actId="1036"/>
+          <ac:picMkLst>
+            <pc:docMk/>
+            <pc:sldMk cId="1718816784" sldId="431"/>
+            <ac:picMk id="6" creationId="{47517E68-9736-407A-A5BD-607CAAC0D637}"/>
+          </ac:picMkLst>
+        </pc:picChg>
+      </pc:sldChg>
+      <pc:sldChg chg="modSp mod">
+        <pc:chgData name="Francescatto, Margherita" userId="8dce2127-3ed7-41e9-a69d-639dab6d0671" providerId="ADAL" clId="{5187E7B3-9ACA-49E3-A656-FF3AA81F6BB4}" dt="2024-03-12T09:53:00.107" v="502" actId="20577"/>
+        <pc:sldMkLst>
+          <pc:docMk/>
+          <pc:sldMk cId="842892331" sldId="432"/>
+        </pc:sldMkLst>
+        <pc:spChg chg="mod">
+          <ac:chgData name="Francescatto, Margherita" userId="8dce2127-3ed7-41e9-a69d-639dab6d0671" providerId="ADAL" clId="{5187E7B3-9ACA-49E3-A656-FF3AA81F6BB4}" dt="2024-03-12T09:53:00.107" v="502" actId="20577"/>
+          <ac:spMkLst>
+            <pc:docMk/>
+            <pc:sldMk cId="842892331" sldId="432"/>
+            <ac:spMk id="9" creationId="{BECFC77B-6DD8-4F54-8E01-9C253CB35BC4}"/>
+          </ac:spMkLst>
+        </pc:spChg>
+      </pc:sldChg>
+      <pc:sldChg chg="modSp mod">
+        <pc:chgData name="Francescatto, Margherita" userId="8dce2127-3ed7-41e9-a69d-639dab6d0671" providerId="ADAL" clId="{5187E7B3-9ACA-49E3-A656-FF3AA81F6BB4}" dt="2024-03-12T09:53:55.587" v="507" actId="113"/>
+        <pc:sldMkLst>
+          <pc:docMk/>
+          <pc:sldMk cId="3131346346" sldId="435"/>
+        </pc:sldMkLst>
+        <pc:spChg chg="mod">
+          <ac:chgData name="Francescatto, Margherita" userId="8dce2127-3ed7-41e9-a69d-639dab6d0671" providerId="ADAL" clId="{5187E7B3-9ACA-49E3-A656-FF3AA81F6BB4}" dt="2024-03-12T09:53:55.587" v="507" actId="113"/>
+          <ac:spMkLst>
+            <pc:docMk/>
+            <pc:sldMk cId="3131346346" sldId="435"/>
+            <ac:spMk id="9" creationId="{BECFC77B-6DD8-4F54-8E01-9C253CB35BC4}"/>
+          </ac:spMkLst>
+        </pc:spChg>
+      </pc:sldChg>
+      <pc:sldChg chg="modSp mod">
+        <pc:chgData name="Francescatto, Margherita" userId="8dce2127-3ed7-41e9-a69d-639dab6d0671" providerId="ADAL" clId="{5187E7B3-9ACA-49E3-A656-FF3AA81F6BB4}" dt="2024-03-12T09:58:53.869" v="698" actId="1036"/>
+        <pc:sldMkLst>
+          <pc:docMk/>
+          <pc:sldMk cId="1297589712" sldId="438"/>
+        </pc:sldMkLst>
+        <pc:spChg chg="mod">
+          <ac:chgData name="Francescatto, Margherita" userId="8dce2127-3ed7-41e9-a69d-639dab6d0671" providerId="ADAL" clId="{5187E7B3-9ACA-49E3-A656-FF3AA81F6BB4}" dt="2024-03-12T09:57:47.206" v="653" actId="20577"/>
+          <ac:spMkLst>
+            <pc:docMk/>
+            <pc:sldMk cId="1297589712" sldId="438"/>
+            <ac:spMk id="2" creationId="{532720A5-5A72-40C7-BED8-4B8FFE6E6EB0}"/>
+          </ac:spMkLst>
+        </pc:spChg>
+        <pc:spChg chg="mod">
+          <ac:chgData name="Francescatto, Margherita" userId="8dce2127-3ed7-41e9-a69d-639dab6d0671" providerId="ADAL" clId="{5187E7B3-9ACA-49E3-A656-FF3AA81F6BB4}" dt="2024-03-12T09:58:45.360" v="684" actId="20577"/>
+          <ac:spMkLst>
+            <pc:docMk/>
+            <pc:sldMk cId="1297589712" sldId="438"/>
+            <ac:spMk id="9" creationId="{BECFC77B-6DD8-4F54-8E01-9C253CB35BC4}"/>
+          </ac:spMkLst>
+        </pc:spChg>
+        <pc:picChg chg="mod">
+          <ac:chgData name="Francescatto, Margherita" userId="8dce2127-3ed7-41e9-a69d-639dab6d0671" providerId="ADAL" clId="{5187E7B3-9ACA-49E3-A656-FF3AA81F6BB4}" dt="2024-03-12T09:58:53.869" v="698" actId="1036"/>
+          <ac:picMkLst>
+            <pc:docMk/>
+            <pc:sldMk cId="1297589712" sldId="438"/>
+            <ac:picMk id="6" creationId="{EC4B67D2-F522-43F9-8DE5-00947C75EB06}"/>
+          </ac:picMkLst>
+        </pc:picChg>
+      </pc:sldChg>
+      <pc:sldChg chg="modSp mod ord">
+        <pc:chgData name="Francescatto, Margherita" userId="8dce2127-3ed7-41e9-a69d-639dab6d0671" providerId="ADAL" clId="{5187E7B3-9ACA-49E3-A656-FF3AA81F6BB4}" dt="2024-03-05T15:26:36.777" v="21" actId="20577"/>
+        <pc:sldMkLst>
+          <pc:docMk/>
+          <pc:sldMk cId="2890381243" sldId="439"/>
+        </pc:sldMkLst>
+        <pc:spChg chg="mod">
+          <ac:chgData name="Francescatto, Margherita" userId="8dce2127-3ed7-41e9-a69d-639dab6d0671" providerId="ADAL" clId="{5187E7B3-9ACA-49E3-A656-FF3AA81F6BB4}" dt="2024-03-05T15:26:36.777" v="21" actId="20577"/>
+          <ac:spMkLst>
+            <pc:docMk/>
+            <pc:sldMk cId="2890381243" sldId="439"/>
+            <ac:spMk id="11" creationId="{825EE2FD-D59C-4D6F-93E9-415E324D68C1}"/>
+          </ac:spMkLst>
+        </pc:spChg>
+      </pc:sldChg>
+      <pc:sldChg chg="addSp delSp modSp new del mod">
+        <pc:chgData name="Francescatto, Margherita" userId="8dce2127-3ed7-41e9-a69d-639dab6d0671" providerId="ADAL" clId="{5187E7B3-9ACA-49E3-A656-FF3AA81F6BB4}" dt="2024-03-12T10:02:55.264" v="726" actId="2696"/>
+        <pc:sldMkLst>
+          <pc:docMk/>
+          <pc:sldMk cId="1034523910" sldId="440"/>
+        </pc:sldMkLst>
+        <pc:spChg chg="mod">
+          <ac:chgData name="Francescatto, Margherita" userId="8dce2127-3ed7-41e9-a69d-639dab6d0671" providerId="ADAL" clId="{5187E7B3-9ACA-49E3-A656-FF3AA81F6BB4}" dt="2024-03-12T10:02:52.485" v="724" actId="1076"/>
+          <ac:spMkLst>
+            <pc:docMk/>
+            <pc:sldMk cId="1034523910" sldId="440"/>
+            <ac:spMk id="2" creationId="{2A3CFB06-5EC5-2A80-71A1-0181C3D615B0}"/>
+          </ac:spMkLst>
+        </pc:spChg>
+        <pc:spChg chg="del">
+          <ac:chgData name="Francescatto, Margherita" userId="8dce2127-3ed7-41e9-a69d-639dab6d0671" providerId="ADAL" clId="{5187E7B3-9ACA-49E3-A656-FF3AA81F6BB4}" dt="2024-03-12T10:02:10.016" v="702" actId="478"/>
+          <ac:spMkLst>
+            <pc:docMk/>
+            <pc:sldMk cId="1034523910" sldId="440"/>
+            <ac:spMk id="3" creationId="{E9651F44-807D-37F1-E324-A433483D4E70}"/>
+          </ac:spMkLst>
+        </pc:spChg>
+        <pc:spChg chg="del">
+          <ac:chgData name="Francescatto, Margherita" userId="8dce2127-3ed7-41e9-a69d-639dab6d0671" providerId="ADAL" clId="{5187E7B3-9ACA-49E3-A656-FF3AA81F6BB4}" dt="2024-03-12T10:02:10.016" v="702" actId="478"/>
+          <ac:spMkLst>
+            <pc:docMk/>
+            <pc:sldMk cId="1034523910" sldId="440"/>
+            <ac:spMk id="4" creationId="{40F312B1-DF5B-51C6-CEA7-EE0B7FE210D7}"/>
+          </ac:spMkLst>
+        </pc:spChg>
+        <pc:spChg chg="del">
+          <ac:chgData name="Francescatto, Margherita" userId="8dce2127-3ed7-41e9-a69d-639dab6d0671" providerId="ADAL" clId="{5187E7B3-9ACA-49E3-A656-FF3AA81F6BB4}" dt="2024-03-12T10:02:10.016" v="702" actId="478"/>
+          <ac:spMkLst>
+            <pc:docMk/>
+            <pc:sldMk cId="1034523910" sldId="440"/>
+            <ac:spMk id="5" creationId="{7C867DCB-8AFB-E57A-034F-CA695CDF7F45}"/>
+          </ac:spMkLst>
+        </pc:spChg>
+        <pc:spChg chg="del">
+          <ac:chgData name="Francescatto, Margherita" userId="8dce2127-3ed7-41e9-a69d-639dab6d0671" providerId="ADAL" clId="{5187E7B3-9ACA-49E3-A656-FF3AA81F6BB4}" dt="2024-03-12T10:02:10.016" v="702" actId="478"/>
+          <ac:spMkLst>
+            <pc:docMk/>
+            <pc:sldMk cId="1034523910" sldId="440"/>
+            <ac:spMk id="6" creationId="{3357B8AA-3A0B-9F68-CABF-CB7237B7CEE8}"/>
+          </ac:spMkLst>
+        </pc:spChg>
+        <pc:spChg chg="del">
+          <ac:chgData name="Francescatto, Margherita" userId="8dce2127-3ed7-41e9-a69d-639dab6d0671" providerId="ADAL" clId="{5187E7B3-9ACA-49E3-A656-FF3AA81F6BB4}" dt="2024-03-12T10:02:10.016" v="702" actId="478"/>
+          <ac:spMkLst>
+            <pc:docMk/>
+            <pc:sldMk cId="1034523910" sldId="440"/>
+            <ac:spMk id="7" creationId="{A3CC3187-173E-2A04-B57B-E991FE024049}"/>
+          </ac:spMkLst>
+        </pc:spChg>
+        <pc:spChg chg="del">
+          <ac:chgData name="Francescatto, Margherita" userId="8dce2127-3ed7-41e9-a69d-639dab6d0671" providerId="ADAL" clId="{5187E7B3-9ACA-49E3-A656-FF3AA81F6BB4}" dt="2024-03-12T10:02:10.016" v="702" actId="478"/>
+          <ac:spMkLst>
+            <pc:docMk/>
+            <pc:sldMk cId="1034523910" sldId="440"/>
+            <ac:spMk id="8" creationId="{B617CC5B-72D3-E397-0359-87860DBDB038}"/>
+          </ac:spMkLst>
+        </pc:spChg>
+        <pc:spChg chg="del">
+          <ac:chgData name="Francescatto, Margherita" userId="8dce2127-3ed7-41e9-a69d-639dab6d0671" providerId="ADAL" clId="{5187E7B3-9ACA-49E3-A656-FF3AA81F6BB4}" dt="2024-03-12T10:02:10.016" v="702" actId="478"/>
+          <ac:spMkLst>
+            <pc:docMk/>
+            <pc:sldMk cId="1034523910" sldId="440"/>
+            <ac:spMk id="9" creationId="{4F4DBE1B-F03B-1583-7A07-972CD43E9E77}"/>
+          </ac:spMkLst>
+        </pc:spChg>
+        <pc:spChg chg="del">
+          <ac:chgData name="Francescatto, Margherita" userId="8dce2127-3ed7-41e9-a69d-639dab6d0671" providerId="ADAL" clId="{5187E7B3-9ACA-49E3-A656-FF3AA81F6BB4}" dt="2024-03-12T10:02:10.016" v="702" actId="478"/>
+          <ac:spMkLst>
+            <pc:docMk/>
+            <pc:sldMk cId="1034523910" sldId="440"/>
+            <ac:spMk id="10" creationId="{7DE9FEFE-181B-B28D-6545-290FEDFE21DA}"/>
+          </ac:spMkLst>
+        </pc:spChg>
+        <pc:spChg chg="del">
+          <ac:chgData name="Francescatto, Margherita" userId="8dce2127-3ed7-41e9-a69d-639dab6d0671" providerId="ADAL" clId="{5187E7B3-9ACA-49E3-A656-FF3AA81F6BB4}" dt="2024-03-12T10:02:10.016" v="702" actId="478"/>
+          <ac:spMkLst>
+            <pc:docMk/>
+            <pc:sldMk cId="1034523910" sldId="440"/>
+            <ac:spMk id="11" creationId="{418CC444-7E02-3A00-CB9F-798A186DCCE7}"/>
+          </ac:spMkLst>
+        </pc:spChg>
+        <pc:spChg chg="del">
+          <ac:chgData name="Francescatto, Margherita" userId="8dce2127-3ed7-41e9-a69d-639dab6d0671" providerId="ADAL" clId="{5187E7B3-9ACA-49E3-A656-FF3AA81F6BB4}" dt="2024-03-12T10:02:10.016" v="702" actId="478"/>
+          <ac:spMkLst>
+            <pc:docMk/>
+            <pc:sldMk cId="1034523910" sldId="440"/>
+            <ac:spMk id="12" creationId="{5BA3BEA1-6348-D3FC-926C-5D31F4BFBA58}"/>
+          </ac:spMkLst>
+        </pc:spChg>
+        <pc:spChg chg="del">
+          <ac:chgData name="Francescatto, Margherita" userId="8dce2127-3ed7-41e9-a69d-639dab6d0671" providerId="ADAL" clId="{5187E7B3-9ACA-49E3-A656-FF3AA81F6BB4}" dt="2024-03-12T10:02:10.016" v="702" actId="478"/>
+          <ac:spMkLst>
+            <pc:docMk/>
+            <pc:sldMk cId="1034523910" sldId="440"/>
+            <ac:spMk id="13" creationId="{CFCE61E0-1B0A-7D8A-08F3-30BC05D58E49}"/>
+          </ac:spMkLst>
+        </pc:spChg>
+        <pc:spChg chg="del">
+          <ac:chgData name="Francescatto, Margherita" userId="8dce2127-3ed7-41e9-a69d-639dab6d0671" providerId="ADAL" clId="{5187E7B3-9ACA-49E3-A656-FF3AA81F6BB4}" dt="2024-03-12T10:02:10.016" v="702" actId="478"/>
+          <ac:spMkLst>
+            <pc:docMk/>
+            <pc:sldMk cId="1034523910" sldId="440"/>
+            <ac:spMk id="14" creationId="{E90ABC5F-3F2A-C79C-51CB-D07B2ACDA71E}"/>
+          </ac:spMkLst>
+        </pc:spChg>
+        <pc:spChg chg="del">
+          <ac:chgData name="Francescatto, Margherita" userId="8dce2127-3ed7-41e9-a69d-639dab6d0671" providerId="ADAL" clId="{5187E7B3-9ACA-49E3-A656-FF3AA81F6BB4}" dt="2024-03-12T10:02:10.016" v="702" actId="478"/>
+          <ac:spMkLst>
+            <pc:docMk/>
+            <pc:sldMk cId="1034523910" sldId="440"/>
+            <ac:spMk id="15" creationId="{74A898F2-A7EF-62CD-C590-843F6542AB2A}"/>
+          </ac:spMkLst>
+        </pc:spChg>
+        <pc:spChg chg="del">
+          <ac:chgData name="Francescatto, Margherita" userId="8dce2127-3ed7-41e9-a69d-639dab6d0671" providerId="ADAL" clId="{5187E7B3-9ACA-49E3-A656-FF3AA81F6BB4}" dt="2024-03-12T10:02:10.016" v="702" actId="478"/>
+          <ac:spMkLst>
+            <pc:docMk/>
+            <pc:sldMk cId="1034523910" sldId="440"/>
+            <ac:spMk id="16" creationId="{5D2723C7-E88A-1714-E522-D0AF2496C2A3}"/>
+          </ac:spMkLst>
+        </pc:spChg>
+        <pc:spChg chg="del">
+          <ac:chgData name="Francescatto, Margherita" userId="8dce2127-3ed7-41e9-a69d-639dab6d0671" providerId="ADAL" clId="{5187E7B3-9ACA-49E3-A656-FF3AA81F6BB4}" dt="2024-03-12T10:02:10.016" v="702" actId="478"/>
+          <ac:spMkLst>
+            <pc:docMk/>
+            <pc:sldMk cId="1034523910" sldId="440"/>
+            <ac:spMk id="17" creationId="{7941AF5D-E918-7925-29E7-741A5B1127E4}"/>
+          </ac:spMkLst>
+        </pc:spChg>
+        <pc:spChg chg="del">
+          <ac:chgData name="Francescatto, Margherita" userId="8dce2127-3ed7-41e9-a69d-639dab6d0671" providerId="ADAL" clId="{5187E7B3-9ACA-49E3-A656-FF3AA81F6BB4}" dt="2024-03-12T10:02:10.016" v="702" actId="478"/>
+          <ac:spMkLst>
+            <pc:docMk/>
+            <pc:sldMk cId="1034523910" sldId="440"/>
+            <ac:spMk id="18" creationId="{DC21ADD4-35AD-4EEC-1098-4BC226BAF2CB}"/>
+          </ac:spMkLst>
+        </pc:spChg>
+        <pc:spChg chg="del">
+          <ac:chgData name="Francescatto, Margherita" userId="8dce2127-3ed7-41e9-a69d-639dab6d0671" providerId="ADAL" clId="{5187E7B3-9ACA-49E3-A656-FF3AA81F6BB4}" dt="2024-03-12T10:02:10.016" v="702" actId="478"/>
+          <ac:spMkLst>
+            <pc:docMk/>
+            <pc:sldMk cId="1034523910" sldId="440"/>
+            <ac:spMk id="19" creationId="{2897762F-1E83-A7E9-3757-90C023F500B7}"/>
+          </ac:spMkLst>
+        </pc:spChg>
+        <pc:spChg chg="del">
+          <ac:chgData name="Francescatto, Margherita" userId="8dce2127-3ed7-41e9-a69d-639dab6d0671" providerId="ADAL" clId="{5187E7B3-9ACA-49E3-A656-FF3AA81F6BB4}" dt="2024-03-12T10:02:10.016" v="702" actId="478"/>
+          <ac:spMkLst>
+            <pc:docMk/>
+            <pc:sldMk cId="1034523910" sldId="440"/>
+            <ac:spMk id="20" creationId="{9B3C6D2A-0C7E-05A9-2194-934D2C2F9B65}"/>
+          </ac:spMkLst>
+        </pc:spChg>
+        <pc:spChg chg="add mod">
+          <ac:chgData name="Francescatto, Margherita" userId="8dce2127-3ed7-41e9-a69d-639dab6d0671" providerId="ADAL" clId="{5187E7B3-9ACA-49E3-A656-FF3AA81F6BB4}" dt="2024-03-12T10:02:53.094" v="725" actId="1076"/>
+          <ac:spMkLst>
+            <pc:docMk/>
+            <pc:sldMk cId="1034523910" sldId="440"/>
+            <ac:spMk id="22" creationId="{E5EEEC61-4D3A-FF00-895E-C9905CF06481}"/>
+          </ac:spMkLst>
+        </pc:spChg>
+        <pc:spChg chg="add mod">
+          <ac:chgData name="Francescatto, Margherita" userId="8dce2127-3ed7-41e9-a69d-639dab6d0671" providerId="ADAL" clId="{5187E7B3-9ACA-49E3-A656-FF3AA81F6BB4}" dt="2024-03-12T10:02:53.094" v="725" actId="1076"/>
+          <ac:spMkLst>
+            <pc:docMk/>
+            <pc:sldMk cId="1034523910" sldId="440"/>
+            <ac:spMk id="24" creationId="{E53B743C-88A4-657E-7F77-7D6E68931049}"/>
+          </ac:spMkLst>
+        </pc:spChg>
+        <pc:spChg chg="add mod">
+          <ac:chgData name="Francescatto, Margherita" userId="8dce2127-3ed7-41e9-a69d-639dab6d0671" providerId="ADAL" clId="{5187E7B3-9ACA-49E3-A656-FF3AA81F6BB4}" dt="2024-03-12T10:02:53.094" v="725" actId="1076"/>
+          <ac:spMkLst>
+            <pc:docMk/>
+            <pc:sldMk cId="1034523910" sldId="440"/>
+            <ac:spMk id="26" creationId="{0D6650B4-4B7D-2C55-CAA6-647BD2B61476}"/>
+          </ac:spMkLst>
+        </pc:spChg>
+        <pc:spChg chg="add mod">
+          <ac:chgData name="Francescatto, Margherita" userId="8dce2127-3ed7-41e9-a69d-639dab6d0671" providerId="ADAL" clId="{5187E7B3-9ACA-49E3-A656-FF3AA81F6BB4}" dt="2024-03-12T10:02:53.094" v="725" actId="1076"/>
+          <ac:spMkLst>
+            <pc:docMk/>
+            <pc:sldMk cId="1034523910" sldId="440"/>
+            <ac:spMk id="27" creationId="{742BAC36-8C40-27D5-E8AA-681D7B859646}"/>
+          </ac:spMkLst>
+        </pc:spChg>
+        <pc:picChg chg="add mod">
+          <ac:chgData name="Francescatto, Margherita" userId="8dce2127-3ed7-41e9-a69d-639dab6d0671" providerId="ADAL" clId="{5187E7B3-9ACA-49E3-A656-FF3AA81F6BB4}" dt="2024-03-12T10:02:53.094" v="725" actId="1076"/>
+          <ac:picMkLst>
+            <pc:docMk/>
+            <pc:sldMk cId="1034523910" sldId="440"/>
+            <ac:picMk id="23" creationId="{CFCC90DC-5C57-0AB1-9645-31C075DB9A10}"/>
+          </ac:picMkLst>
+        </pc:picChg>
+        <pc:picChg chg="add mod">
+          <ac:chgData name="Francescatto, Margherita" userId="8dce2127-3ed7-41e9-a69d-639dab6d0671" providerId="ADAL" clId="{5187E7B3-9ACA-49E3-A656-FF3AA81F6BB4}" dt="2024-03-12T10:02:53.094" v="725" actId="1076"/>
+          <ac:picMkLst>
+            <pc:docMk/>
+            <pc:sldMk cId="1034523910" sldId="440"/>
+            <ac:picMk id="25" creationId="{1FD9774B-EA65-8544-9FCE-B51CAB9FDDBB}"/>
+          </ac:picMkLst>
+        </pc:picChg>
+      </pc:sldChg>
+      <pc:sldChg chg="delSp modSp add mod ord setBg">
+        <pc:chgData name="Francescatto, Margherita" userId="8dce2127-3ed7-41e9-a69d-639dab6d0671" providerId="ADAL" clId="{5187E7B3-9ACA-49E3-A656-FF3AA81F6BB4}" dt="2024-03-12T10:05:16.976" v="865"/>
+        <pc:sldMkLst>
+          <pc:docMk/>
+          <pc:sldMk cId="2972967479" sldId="440"/>
+        </pc:sldMkLst>
+        <pc:spChg chg="mod">
+          <ac:chgData name="Francescatto, Margherita" userId="8dce2127-3ed7-41e9-a69d-639dab6d0671" providerId="ADAL" clId="{5187E7B3-9ACA-49E3-A656-FF3AA81F6BB4}" dt="2024-03-12T10:04:15.594" v="796" actId="14100"/>
+          <ac:spMkLst>
+            <pc:docMk/>
+            <pc:sldMk cId="2972967479" sldId="440"/>
+            <ac:spMk id="2" creationId="{26D8AD59-EFB0-42F3-8BCC-D937A691AD5F}"/>
+          </ac:spMkLst>
+        </pc:spChg>
+        <pc:spChg chg="del">
+          <ac:chgData name="Francescatto, Margherita" userId="8dce2127-3ed7-41e9-a69d-639dab6d0671" providerId="ADAL" clId="{5187E7B3-9ACA-49E3-A656-FF3AA81F6BB4}" dt="2024-03-12T10:03:39.695" v="732" actId="478"/>
+          <ac:spMkLst>
+            <pc:docMk/>
+            <pc:sldMk cId="2972967479" sldId="440"/>
+            <ac:spMk id="9" creationId="{1F36126F-F9B8-484C-8317-E3C35A8C4047}"/>
+          </ac:spMkLst>
+        </pc:spChg>
+        <pc:spChg chg="mod">
+          <ac:chgData name="Francescatto, Margherita" userId="8dce2127-3ed7-41e9-a69d-639dab6d0671" providerId="ADAL" clId="{5187E7B3-9ACA-49E3-A656-FF3AA81F6BB4}" dt="2024-03-12T10:04:22.660" v="863" actId="1036"/>
+          <ac:spMkLst>
+            <pc:docMk/>
+            <pc:sldMk cId="2972967479" sldId="440"/>
+            <ac:spMk id="12" creationId="{1A6AA38E-A0F5-4F89-9582-57CAF39145FC}"/>
+          </ac:spMkLst>
+        </pc:spChg>
+        <pc:spChg chg="mod">
+          <ac:chgData name="Francescatto, Margherita" userId="8dce2127-3ed7-41e9-a69d-639dab6d0671" providerId="ADAL" clId="{5187E7B3-9ACA-49E3-A656-FF3AA81F6BB4}" dt="2024-03-12T10:04:22.660" v="863" actId="1036"/>
+          <ac:spMkLst>
+            <pc:docMk/>
+            <pc:sldMk cId="2972967479" sldId="440"/>
+            <ac:spMk id="14" creationId="{2208F9CB-786D-45E9-A30A-090DAC71E2E1}"/>
+          </ac:spMkLst>
+        </pc:spChg>
+        <pc:spChg chg="mod">
+          <ac:chgData name="Francescatto, Margherita" userId="8dce2127-3ed7-41e9-a69d-639dab6d0671" providerId="ADAL" clId="{5187E7B3-9ACA-49E3-A656-FF3AA81F6BB4}" dt="2024-03-12T10:04:49.539" v="864"/>
+          <ac:spMkLst>
+            <pc:docMk/>
+            <pc:sldMk cId="2972967479" sldId="440"/>
+            <ac:spMk id="16" creationId="{B5575085-1C13-4A80-86E1-DDE70BEA5456}"/>
+          </ac:spMkLst>
+        </pc:spChg>
+        <pc:spChg chg="mod">
+          <ac:chgData name="Francescatto, Margherita" userId="8dce2127-3ed7-41e9-a69d-639dab6d0671" providerId="ADAL" clId="{5187E7B3-9ACA-49E3-A656-FF3AA81F6BB4}" dt="2024-03-12T10:05:16.976" v="865"/>
+          <ac:spMkLst>
+            <pc:docMk/>
+            <pc:sldMk cId="2972967479" sldId="440"/>
+            <ac:spMk id="17" creationId="{8683B839-408B-4D3A-9561-0775ABDD02AB}"/>
+          </ac:spMkLst>
+        </pc:spChg>
+        <pc:picChg chg="mod">
+          <ac:chgData name="Francescatto, Margherita" userId="8dce2127-3ed7-41e9-a69d-639dab6d0671" providerId="ADAL" clId="{5187E7B3-9ACA-49E3-A656-FF3AA81F6BB4}" dt="2024-03-12T10:04:22.660" v="863" actId="1036"/>
+          <ac:picMkLst>
+            <pc:docMk/>
+            <pc:sldMk cId="2972967479" sldId="440"/>
+            <ac:picMk id="13" creationId="{E1C18D8C-58C2-4149-AA23-C499F568EC15}"/>
+          </ac:picMkLst>
+        </pc:picChg>
+        <pc:picChg chg="mod">
+          <ac:chgData name="Francescatto, Margherita" userId="8dce2127-3ed7-41e9-a69d-639dab6d0671" providerId="ADAL" clId="{5187E7B3-9ACA-49E3-A656-FF3AA81F6BB4}" dt="2024-03-12T10:04:22.660" v="863" actId="1036"/>
+          <ac:picMkLst>
+            <pc:docMk/>
+            <pc:sldMk cId="2972967479" sldId="440"/>
+            <ac:picMk id="15" creationId="{D48181D6-C6EF-4133-A822-B68929AE26F5}"/>
+          </ac:picMkLst>
+        </pc:picChg>
+      </pc:sldChg>
+    </pc:docChg>
+  </pc:docChgLst>
+  <pc:docChgLst>
+    <pc:chgData name="McKinney, David" userId="S::kqkh779@astrazeneca.net::8b945cb3-78ce-42d7-adc5-b07bab32cd5b" providerId="AD" clId="Web-{A3F1E17F-75AC-45B8-AC87-605E8FE95041}"/>
+    <pc:docChg chg="addSld modSld">
+      <pc:chgData name="McKinney, David" userId="S::kqkh779@astrazeneca.net::8b945cb3-78ce-42d7-adc5-b07bab32cd5b" providerId="AD" clId="Web-{A3F1E17F-75AC-45B8-AC87-605E8FE95041}" dt="2020-02-13T11:48:59.943" v="45" actId="1076"/>
+      <pc:docMkLst>
+        <pc:docMk/>
+      </pc:docMkLst>
+      <pc:sldChg chg="modSp">
+        <pc:chgData name="McKinney, David" userId="S::kqkh779@astrazeneca.net::8b945cb3-78ce-42d7-adc5-b07bab32cd5b" providerId="AD" clId="Web-{A3F1E17F-75AC-45B8-AC87-605E8FE95041}" dt="2020-02-13T11:45:09.740" v="21" actId="20577"/>
+        <pc:sldMkLst>
+          <pc:docMk/>
+          <pc:sldMk cId="2499478442" sldId="365"/>
+        </pc:sldMkLst>
+        <pc:spChg chg="mod">
+          <ac:chgData name="McKinney, David" userId="S::kqkh779@astrazeneca.net::8b945cb3-78ce-42d7-adc5-b07bab32cd5b" providerId="AD" clId="Web-{A3F1E17F-75AC-45B8-AC87-605E8FE95041}" dt="2020-02-13T11:45:09.740" v="21" actId="20577"/>
+          <ac:spMkLst>
+            <pc:docMk/>
+            <pc:sldMk cId="2499478442" sldId="365"/>
+            <ac:spMk id="3" creationId="{D9F59F0A-AA59-4F15-95CC-124F6F55180D}"/>
+          </ac:spMkLst>
+        </pc:spChg>
+      </pc:sldChg>
+      <pc:sldChg chg="addSp delSp modSp add replId">
+        <pc:chgData name="McKinney, David" userId="S::kqkh779@astrazeneca.net::8b945cb3-78ce-42d7-adc5-b07bab32cd5b" providerId="AD" clId="Web-{A3F1E17F-75AC-45B8-AC87-605E8FE95041}" dt="2020-02-13T11:48:59.943" v="45" actId="1076"/>
+        <pc:sldMkLst>
+          <pc:docMk/>
+          <pc:sldMk cId="2819223974" sldId="422"/>
+        </pc:sldMkLst>
+        <pc:spChg chg="mod">
+          <ac:chgData name="McKinney, David" userId="S::kqkh779@astrazeneca.net::8b945cb3-78ce-42d7-adc5-b07bab32cd5b" providerId="AD" clId="Web-{A3F1E17F-75AC-45B8-AC87-605E8FE95041}" dt="2020-02-13T11:45:14.911" v="23" actId="20577"/>
+          <ac:spMkLst>
+            <pc:docMk/>
+            <pc:sldMk cId="2819223974" sldId="422"/>
+            <ac:spMk id="3" creationId="{D9F59F0A-AA59-4F15-95CC-124F6F55180D}"/>
+          </ac:spMkLst>
+        </pc:spChg>
+        <pc:picChg chg="del">
+          <ac:chgData name="McKinney, David" userId="S::kqkh779@astrazeneca.net::8b945cb3-78ce-42d7-adc5-b07bab32cd5b" providerId="AD" clId="Web-{A3F1E17F-75AC-45B8-AC87-605E8FE95041}" dt="2020-02-13T11:48:40.850" v="36"/>
+          <ac:picMkLst>
+            <pc:docMk/>
+            <pc:sldMk cId="2819223974" sldId="422"/>
+            <ac:picMk id="5" creationId="{EB4C028F-E23D-4091-962F-46D6A6A0B8A1}"/>
+          </ac:picMkLst>
+        </pc:picChg>
+        <pc:picChg chg="add del mod">
+          <ac:chgData name="McKinney, David" userId="S::kqkh779@astrazeneca.net::8b945cb3-78ce-42d7-adc5-b07bab32cd5b" providerId="AD" clId="Web-{A3F1E17F-75AC-45B8-AC87-605E8FE95041}" dt="2020-02-13T11:47:54.303" v="25"/>
+          <ac:picMkLst>
+            <pc:docMk/>
+            <pc:sldMk cId="2819223974" sldId="422"/>
+            <ac:picMk id="6" creationId="{133305DB-CFA2-44BF-8CD9-E123986488B3}"/>
+          </ac:picMkLst>
+        </pc:picChg>
+        <pc:picChg chg="add mod">
+          <ac:chgData name="McKinney, David" userId="S::kqkh779@astrazeneca.net::8b945cb3-78ce-42d7-adc5-b07bab32cd5b" providerId="AD" clId="Web-{A3F1E17F-75AC-45B8-AC87-605E8FE95041}" dt="2020-02-13T11:48:59.943" v="45" actId="1076"/>
+          <ac:picMkLst>
+            <pc:docMk/>
+            <pc:sldMk cId="2819223974" sldId="422"/>
+            <ac:picMk id="9" creationId="{A58C0E81-5A34-4153-B80F-5987F9950C45}"/>
+          </ac:picMkLst>
+        </pc:picChg>
+        <pc:picChg chg="add mod">
+          <ac:chgData name="McKinney, David" userId="S::kqkh779@astrazeneca.net::8b945cb3-78ce-42d7-adc5-b07bab32cd5b" providerId="AD" clId="Web-{A3F1E17F-75AC-45B8-AC87-605E8FE95041}" dt="2020-02-13T11:48:58.022" v="44" actId="1076"/>
+          <ac:picMkLst>
+            <pc:docMk/>
+            <pc:sldMk cId="2819223974" sldId="422"/>
+            <ac:picMk id="11" creationId="{03304E51-3B93-4348-80E7-9A3D07B59455}"/>
+          </ac:picMkLst>
+        </pc:picChg>
+        <pc:picChg chg="del">
+          <ac:chgData name="McKinney, David" userId="S::kqkh779@astrazeneca.net::8b945cb3-78ce-42d7-adc5-b07bab32cd5b" providerId="AD" clId="Web-{A3F1E17F-75AC-45B8-AC87-605E8FE95041}" dt="2020-02-13T11:48:42.537" v="37"/>
+          <ac:picMkLst>
+            <pc:docMk/>
+            <pc:sldMk cId="2819223974" sldId="422"/>
+            <ac:picMk id="1032" creationId="{CC0E1BB1-AC2B-4727-BACD-21A08E047076}"/>
+          </ac:picMkLst>
+        </pc:picChg>
+        <pc:cxnChg chg="del">
+          <ac:chgData name="McKinney, David" userId="S::kqkh779@astrazeneca.net::8b945cb3-78ce-42d7-adc5-b07bab32cd5b" providerId="AD" clId="Web-{A3F1E17F-75AC-45B8-AC87-605E8FE95041}" dt="2020-02-13T11:48:44.584" v="38"/>
+          <ac:cxnSpMkLst>
+            <pc:docMk/>
+            <pc:sldMk cId="2819223974" sldId="422"/>
+            <ac:cxnSpMk id="7" creationId="{94E50603-B748-4EAD-823F-CFC68A339D5B}"/>
+          </ac:cxnSpMkLst>
+        </pc:cxnChg>
+      </pc:sldChg>
+    </pc:docChg>
+  </pc:docChgLst>
   <pc:docChgLst>
     <pc:chgData name="McKinney, David" userId="8b945cb3-78ce-42d7-adc5-b07bab32cd5b" providerId="ADAL" clId="{10779F69-084B-46DF-8B9A-577A83F6E190}"/>
     <pc:docChg chg="custSel addSld delSld modSld sldOrd">
@@ -617,93 +1295,6 @@
       </pc:sldChg>
     </pc:docChg>
   </pc:docChgLst>
-  <pc:docChgLst>
-    <pc:chgData name="McKinney, David" userId="S::kqkh779@astrazeneca.net::8b945cb3-78ce-42d7-adc5-b07bab32cd5b" providerId="AD" clId="Web-{A3F1E17F-75AC-45B8-AC87-605E8FE95041}"/>
-    <pc:docChg chg="addSld modSld">
-      <pc:chgData name="McKinney, David" userId="S::kqkh779@astrazeneca.net::8b945cb3-78ce-42d7-adc5-b07bab32cd5b" providerId="AD" clId="Web-{A3F1E17F-75AC-45B8-AC87-605E8FE95041}" dt="2020-02-13T11:48:59.943" v="45" actId="1076"/>
-      <pc:docMkLst>
-        <pc:docMk/>
-      </pc:docMkLst>
-      <pc:sldChg chg="modSp">
-        <pc:chgData name="McKinney, David" userId="S::kqkh779@astrazeneca.net::8b945cb3-78ce-42d7-adc5-b07bab32cd5b" providerId="AD" clId="Web-{A3F1E17F-75AC-45B8-AC87-605E8FE95041}" dt="2020-02-13T11:45:09.740" v="21" actId="20577"/>
-        <pc:sldMkLst>
-          <pc:docMk/>
-          <pc:sldMk cId="2499478442" sldId="365"/>
-        </pc:sldMkLst>
-        <pc:spChg chg="mod">
-          <ac:chgData name="McKinney, David" userId="S::kqkh779@astrazeneca.net::8b945cb3-78ce-42d7-adc5-b07bab32cd5b" providerId="AD" clId="Web-{A3F1E17F-75AC-45B8-AC87-605E8FE95041}" dt="2020-02-13T11:45:09.740" v="21" actId="20577"/>
-          <ac:spMkLst>
-            <pc:docMk/>
-            <pc:sldMk cId="2499478442" sldId="365"/>
-            <ac:spMk id="3" creationId="{D9F59F0A-AA59-4F15-95CC-124F6F55180D}"/>
-          </ac:spMkLst>
-        </pc:spChg>
-      </pc:sldChg>
-      <pc:sldChg chg="addSp delSp modSp add replId">
-        <pc:chgData name="McKinney, David" userId="S::kqkh779@astrazeneca.net::8b945cb3-78ce-42d7-adc5-b07bab32cd5b" providerId="AD" clId="Web-{A3F1E17F-75AC-45B8-AC87-605E8FE95041}" dt="2020-02-13T11:48:59.943" v="45" actId="1076"/>
-        <pc:sldMkLst>
-          <pc:docMk/>
-          <pc:sldMk cId="2819223974" sldId="422"/>
-        </pc:sldMkLst>
-        <pc:spChg chg="mod">
-          <ac:chgData name="McKinney, David" userId="S::kqkh779@astrazeneca.net::8b945cb3-78ce-42d7-adc5-b07bab32cd5b" providerId="AD" clId="Web-{A3F1E17F-75AC-45B8-AC87-605E8FE95041}" dt="2020-02-13T11:45:14.911" v="23" actId="20577"/>
-          <ac:spMkLst>
-            <pc:docMk/>
-            <pc:sldMk cId="2819223974" sldId="422"/>
-            <ac:spMk id="3" creationId="{D9F59F0A-AA59-4F15-95CC-124F6F55180D}"/>
-          </ac:spMkLst>
-        </pc:spChg>
-        <pc:picChg chg="del">
-          <ac:chgData name="McKinney, David" userId="S::kqkh779@astrazeneca.net::8b945cb3-78ce-42d7-adc5-b07bab32cd5b" providerId="AD" clId="Web-{A3F1E17F-75AC-45B8-AC87-605E8FE95041}" dt="2020-02-13T11:48:40.850" v="36"/>
-          <ac:picMkLst>
-            <pc:docMk/>
-            <pc:sldMk cId="2819223974" sldId="422"/>
-            <ac:picMk id="5" creationId="{EB4C028F-E23D-4091-962F-46D6A6A0B8A1}"/>
-          </ac:picMkLst>
-        </pc:picChg>
-        <pc:picChg chg="add del mod">
-          <ac:chgData name="McKinney, David" userId="S::kqkh779@astrazeneca.net::8b945cb3-78ce-42d7-adc5-b07bab32cd5b" providerId="AD" clId="Web-{A3F1E17F-75AC-45B8-AC87-605E8FE95041}" dt="2020-02-13T11:47:54.303" v="25"/>
-          <ac:picMkLst>
-            <pc:docMk/>
-            <pc:sldMk cId="2819223974" sldId="422"/>
-            <ac:picMk id="6" creationId="{133305DB-CFA2-44BF-8CD9-E123986488B3}"/>
-          </ac:picMkLst>
-        </pc:picChg>
-        <pc:picChg chg="add mod">
-          <ac:chgData name="McKinney, David" userId="S::kqkh779@astrazeneca.net::8b945cb3-78ce-42d7-adc5-b07bab32cd5b" providerId="AD" clId="Web-{A3F1E17F-75AC-45B8-AC87-605E8FE95041}" dt="2020-02-13T11:48:59.943" v="45" actId="1076"/>
-          <ac:picMkLst>
-            <pc:docMk/>
-            <pc:sldMk cId="2819223974" sldId="422"/>
-            <ac:picMk id="9" creationId="{A58C0E81-5A34-4153-B80F-5987F9950C45}"/>
-          </ac:picMkLst>
-        </pc:picChg>
-        <pc:picChg chg="add mod">
-          <ac:chgData name="McKinney, David" userId="S::kqkh779@astrazeneca.net::8b945cb3-78ce-42d7-adc5-b07bab32cd5b" providerId="AD" clId="Web-{A3F1E17F-75AC-45B8-AC87-605E8FE95041}" dt="2020-02-13T11:48:58.022" v="44" actId="1076"/>
-          <ac:picMkLst>
-            <pc:docMk/>
-            <pc:sldMk cId="2819223974" sldId="422"/>
-            <ac:picMk id="11" creationId="{03304E51-3B93-4348-80E7-9A3D07B59455}"/>
-          </ac:picMkLst>
-        </pc:picChg>
-        <pc:picChg chg="del">
-          <ac:chgData name="McKinney, David" userId="S::kqkh779@astrazeneca.net::8b945cb3-78ce-42d7-adc5-b07bab32cd5b" providerId="AD" clId="Web-{A3F1E17F-75AC-45B8-AC87-605E8FE95041}" dt="2020-02-13T11:48:42.537" v="37"/>
-          <ac:picMkLst>
-            <pc:docMk/>
-            <pc:sldMk cId="2819223974" sldId="422"/>
-            <ac:picMk id="1032" creationId="{CC0E1BB1-AC2B-4727-BACD-21A08E047076}"/>
-          </ac:picMkLst>
-        </pc:picChg>
-        <pc:cxnChg chg="del">
-          <ac:chgData name="McKinney, David" userId="S::kqkh779@astrazeneca.net::8b945cb3-78ce-42d7-adc5-b07bab32cd5b" providerId="AD" clId="Web-{A3F1E17F-75AC-45B8-AC87-605E8FE95041}" dt="2020-02-13T11:48:44.584" v="38"/>
-          <ac:cxnSpMkLst>
-            <pc:docMk/>
-            <pc:sldMk cId="2819223974" sldId="422"/>
-            <ac:cxnSpMk id="7" creationId="{94E50603-B748-4EAD-823F-CFC68A339D5B}"/>
-          </ac:cxnSpMkLst>
-        </pc:cxnChg>
-      </pc:sldChg>
-    </pc:docChg>
-  </pc:docChgLst>
 </pc:chgInfo>
 </file>
 
@@ -790,7 +1381,7 @@
             <a:fld id="{3BBED7E8-0829-F34C-B479-A757805E6C1B}" type="datetimeFigureOut">
               <a:rPr lang="en-US" smtClean="0"/>
               <a:pPr/>
-              <a:t>3/25/2021</a:t>
+              <a:t>3/12/2024</a:t>
             </a:fld>
             <a:endParaRPr lang="en-US"/>
           </a:p>
@@ -958,7 +1549,7 @@
             <a:fld id="{6C7E4F11-7667-5045-A00B-01970EA44BB5}" type="datetimeFigureOut">
               <a:rPr lang="en-US" smtClean="0"/>
               <a:pPr/>
-              <a:t>3/25/2021</a:t>
+              <a:t>3/12/2024</a:t>
             </a:fld>
             <a:endParaRPr lang="en-US"/>
           </a:p>
@@ -27088,6 +27679,9 @@
           </a:lstStyle>
           <a:p>
             <a:pPr marL="342900" indent="-342900">
+              <a:spcBef>
+                <a:spcPts val="1200"/>
+              </a:spcBef>
               <a:buFont typeface="Arial"/>
               <a:buChar char="•"/>
             </a:pPr>
@@ -27101,6 +27695,9 @@
           </a:p>
           <a:p>
             <a:pPr marL="342900" indent="-342900">
+              <a:spcBef>
+                <a:spcPts val="1200"/>
+              </a:spcBef>
               <a:buFont typeface="Arial"/>
               <a:buChar char="•"/>
             </a:pPr>
@@ -27412,6 +28009,9 @@
           </a:p>
           <a:p>
             <a:pPr marL="342900" indent="-342900">
+              <a:spcBef>
+                <a:spcPts val="1200"/>
+              </a:spcBef>
               <a:buFont typeface="Arial"/>
               <a:buChar char="•"/>
             </a:pPr>
@@ -27791,6 +28391,9 @@
           </a:lstStyle>
           <a:p>
             <a:pPr marL="342900" indent="-342900">
+              <a:spcBef>
+                <a:spcPts val="1200"/>
+              </a:spcBef>
               <a:buFont typeface="Arial"/>
               <a:buChar char="•"/>
             </a:pPr>
@@ -27799,11 +28402,28 @@
                 <a:latin typeface="Arial"/>
                 <a:cs typeface="Arial"/>
               </a:rPr>
-              <a:t>Python is able to find the sum of a collection of numbers using the sum() function</a:t>
+              <a:t>Python can add up a collection of numbers using the </a:t>
+            </a:r>
+            <a:r>
+              <a:rPr lang="en-GB" sz="2000" b="1" dirty="0">
+                <a:latin typeface="Arial"/>
+                <a:cs typeface="Arial"/>
+              </a:rPr>
+              <a:t>sum()</a:t>
+            </a:r>
+            <a:r>
+              <a:rPr lang="en-GB" sz="2000" dirty="0">
+                <a:latin typeface="Arial"/>
+                <a:cs typeface="Arial"/>
+              </a:rPr>
+              <a:t> function</a:t>
             </a:r>
           </a:p>
           <a:p>
             <a:pPr marL="342900" indent="-342900">
+              <a:spcBef>
+                <a:spcPts val="1200"/>
+              </a:spcBef>
               <a:buFont typeface="Arial"/>
               <a:buChar char="•"/>
             </a:pPr>
@@ -27817,6 +28437,9 @@
           </a:p>
           <a:p>
             <a:pPr marL="342900" indent="-342900">
+              <a:spcBef>
+                <a:spcPts val="1200"/>
+              </a:spcBef>
               <a:buFont typeface="Arial"/>
               <a:buChar char="•"/>
             </a:pPr>
@@ -27825,11 +28448,21 @@
                 <a:latin typeface="Arial"/>
                 <a:cs typeface="Arial"/>
               </a:rPr>
-              <a:t>One method is using a special type of variable called a list</a:t>
+              <a:t>One method is using a special type of variable called a </a:t>
+            </a:r>
+            <a:r>
+              <a:rPr lang="en-GB" sz="2000" b="1" dirty="0">
+                <a:latin typeface="Arial"/>
+                <a:cs typeface="Arial"/>
+              </a:rPr>
+              <a:t>list</a:t>
             </a:r>
           </a:p>
           <a:p>
             <a:pPr marL="342900" indent="-342900">
+              <a:spcBef>
+                <a:spcPts val="1200"/>
+              </a:spcBef>
               <a:buFont typeface="Arial"/>
               <a:buChar char="•"/>
             </a:pPr>
@@ -27838,24 +28471,14 @@
                 <a:latin typeface="Arial"/>
                 <a:cs typeface="Arial"/>
               </a:rPr>
-              <a:t>We’ll cover these in more detail in a later lesson</a:t>
+              <a:t>You can create a list by filling a set of square brackets with comma-separated values (more details on lists come later in the course)</a:t>
             </a:r>
           </a:p>
           <a:p>
             <a:pPr marL="342900" indent="-342900">
-              <a:buFont typeface="Arial"/>
-              <a:buChar char="•"/>
-            </a:pPr>
-            <a:r>
-              <a:rPr lang="en-GB" sz="2000" dirty="0">
-                <a:latin typeface="Arial"/>
-                <a:cs typeface="Arial"/>
-              </a:rPr>
-              <a:t>For now, all you need to know is that you create a list by filling a set of square brackets with a comma-separated sequence of values</a:t>
-            </a:r>
-          </a:p>
-          <a:p>
-            <a:pPr marL="342900" indent="-342900">
+              <a:spcBef>
+                <a:spcPts val="1200"/>
+              </a:spcBef>
               <a:buFont typeface="Arial"/>
               <a:buChar char="•"/>
             </a:pPr>
@@ -27920,7 +28543,7 @@
         </p:blipFill>
         <p:spPr>
           <a:xfrm>
-            <a:off x="3212567" y="3351328"/>
+            <a:off x="2912847" y="3599799"/>
             <a:ext cx="2638425" cy="1495425"/>
           </a:xfrm>
           <a:prstGeom prst="rect">
@@ -28184,6 +28807,9 @@
           </a:lstStyle>
           <a:p>
             <a:pPr marL="342900" indent="-342900">
+              <a:spcBef>
+                <a:spcPts val="1200"/>
+              </a:spcBef>
               <a:buFont typeface="Arial"/>
               <a:buChar char="•"/>
             </a:pPr>
@@ -28197,6 +28823,9 @@
           </a:p>
           <a:p>
             <a:pPr marL="342900" indent="-342900">
+              <a:spcBef>
+                <a:spcPts val="1200"/>
+              </a:spcBef>
               <a:buFont typeface="Arial"/>
               <a:buChar char="•"/>
             </a:pPr>
@@ -28210,6 +28839,9 @@
           </a:p>
           <a:p>
             <a:pPr marL="342900" indent="-342900">
+              <a:spcBef>
+                <a:spcPts val="1200"/>
+              </a:spcBef>
               <a:buFont typeface="Arial"/>
               <a:buChar char="•"/>
             </a:pPr>
@@ -28223,6 +28855,9 @@
           </a:p>
           <a:p>
             <a:pPr marL="342900" indent="-342900">
+              <a:spcBef>
+                <a:spcPts val="1200"/>
+              </a:spcBef>
               <a:buFont typeface="Arial"/>
               <a:buChar char="•"/>
             </a:pPr>
@@ -28232,7 +28867,11 @@
             </a:endParaRPr>
           </a:p>
           <a:p>
-            <a:pPr algn="ctr"/>
+            <a:pPr algn="ctr">
+              <a:spcBef>
+                <a:spcPts val="1200"/>
+              </a:spcBef>
+            </a:pPr>
             <a:r>
               <a:rPr lang="en-GB" sz="2000" b="1" dirty="0">
                 <a:latin typeface="Arial"/>
@@ -28243,6 +28882,9 @@
           </a:p>
           <a:p>
             <a:pPr marL="342900" indent="-342900">
+              <a:spcBef>
+                <a:spcPts val="1200"/>
+              </a:spcBef>
               <a:buFont typeface="Arial" panose="020B0604020202020204" pitchFamily="34" charset="0"/>
               <a:buChar char="•"/>
             </a:pPr>
@@ -28253,6 +28895,9 @@
           </a:p>
           <a:p>
             <a:pPr marL="342900" indent="-342900">
+              <a:spcBef>
+                <a:spcPts val="1200"/>
+              </a:spcBef>
               <a:buFont typeface="Arial" panose="020B0604020202020204" pitchFamily="34" charset="0"/>
               <a:buChar char="•"/>
             </a:pPr>
@@ -28720,6 +29365,9 @@
           </a:lstStyle>
           <a:p>
             <a:pPr marL="342900" indent="-342900">
+              <a:spcBef>
+                <a:spcPts val="1200"/>
+              </a:spcBef>
               <a:buFont typeface="Arial"/>
               <a:buChar char="•"/>
             </a:pPr>
@@ -28728,11 +29376,14 @@
                 <a:latin typeface="Arial"/>
                 <a:cs typeface="Arial"/>
               </a:rPr>
-              <a:t>Summation is not the only thing we can do with lists</a:t>
+              <a:t>Summation is not the only operation we can do with lists</a:t>
             </a:r>
           </a:p>
           <a:p>
             <a:pPr marL="342900" indent="-342900">
+              <a:spcBef>
+                <a:spcPts val="1200"/>
+              </a:spcBef>
               <a:buFont typeface="Arial"/>
               <a:buChar char="•"/>
             </a:pPr>
@@ -28741,20 +29392,51 @@
                 <a:latin typeface="Arial"/>
                 <a:cs typeface="Arial"/>
               </a:rPr>
-              <a:t>As well as sum(), Python has two functions min() and max() which (unsurprisingly) find the minimum and maximum item in a list</a:t>
-            </a:r>
-          </a:p>
-          <a:p>
-            <a:pPr marL="342900" indent="-342900">
-              <a:buFont typeface="Arial"/>
-              <a:buChar char="•"/>
-            </a:pPr>
+              <a:t>E.g., Python has two functions </a:t>
+            </a:r>
+            <a:r>
+              <a:rPr lang="en-GB" sz="2000" b="1" dirty="0">
+                <a:latin typeface="Arial"/>
+                <a:cs typeface="Arial"/>
+              </a:rPr>
+              <a:t>min()</a:t>
+            </a:r>
             <a:r>
               <a:rPr lang="en-GB" sz="2000" dirty="0">
                 <a:latin typeface="Arial"/>
                 <a:cs typeface="Arial"/>
               </a:rPr>
-              <a:t>We use them in the exact same way, passing in a list as the input</a:t>
+              <a:t> and </a:t>
+            </a:r>
+            <a:r>
+              <a:rPr lang="en-GB" sz="2000" b="1" dirty="0">
+                <a:latin typeface="Arial"/>
+                <a:cs typeface="Arial"/>
+              </a:rPr>
+              <a:t>max()</a:t>
+            </a:r>
+            <a:r>
+              <a:rPr lang="en-GB" sz="2000" dirty="0">
+                <a:latin typeface="Arial"/>
+                <a:cs typeface="Arial"/>
+              </a:rPr>
+              <a:t> which (unsurprisingly) find the minimum and maximum item in a list</a:t>
+            </a:r>
+          </a:p>
+          <a:p>
+            <a:pPr marL="342900" indent="-342900">
+              <a:spcBef>
+                <a:spcPts val="1200"/>
+              </a:spcBef>
+              <a:buFont typeface="Arial"/>
+              <a:buChar char="•"/>
+            </a:pPr>
+            <a:r>
+              <a:rPr lang="en-GB" sz="2000" dirty="0">
+                <a:latin typeface="Arial"/>
+                <a:cs typeface="Arial"/>
+              </a:rPr>
+              <a:t>We use them in the same way as sum(), passing in a list as the input</a:t>
             </a:r>
           </a:p>
         </p:txBody>
@@ -28810,7 +29492,7 @@
         </p:blipFill>
         <p:spPr>
           <a:xfrm>
-            <a:off x="1981200" y="2271127"/>
+            <a:off x="1981200" y="2662287"/>
             <a:ext cx="5181600" cy="476250"/>
           </a:xfrm>
           <a:prstGeom prst="rect">
@@ -28840,7 +29522,7 @@
         </p:blipFill>
         <p:spPr>
           <a:xfrm>
-            <a:off x="1187844" y="3130176"/>
+            <a:off x="1187844" y="3521336"/>
             <a:ext cx="3009970" cy="1284254"/>
           </a:xfrm>
           <a:prstGeom prst="rect">
@@ -28870,7 +29552,7 @@
         </p:blipFill>
         <p:spPr>
           <a:xfrm>
-            <a:off x="4759093" y="3130176"/>
+            <a:off x="4759093" y="3521336"/>
             <a:ext cx="3197063" cy="1365324"/>
           </a:xfrm>
           <a:prstGeom prst="rect">
@@ -29134,6 +29816,9 @@
           </a:lstStyle>
           <a:p>
             <a:pPr marL="342900" indent="-342900">
+              <a:spcBef>
+                <a:spcPts val="1200"/>
+              </a:spcBef>
               <a:buFont typeface="Arial"/>
               <a:buChar char="•"/>
             </a:pPr>
@@ -29147,6 +29832,9 @@
           </a:p>
           <a:p>
             <a:pPr marL="342900" indent="-342900">
+              <a:spcBef>
+                <a:spcPts val="1200"/>
+              </a:spcBef>
               <a:buFont typeface="Arial"/>
               <a:buChar char="•"/>
             </a:pPr>
@@ -29160,6 +29848,9 @@
           </a:p>
           <a:p>
             <a:pPr marL="342900" indent="-342900">
+              <a:spcBef>
+                <a:spcPts val="1200"/>
+              </a:spcBef>
               <a:buFont typeface="Arial"/>
               <a:buChar char="•"/>
             </a:pPr>
@@ -29177,6 +29868,9 @@
           </a:p>
           <a:p>
             <a:pPr marL="342900" indent="-342900">
+              <a:spcBef>
+                <a:spcPts val="1200"/>
+              </a:spcBef>
               <a:buFont typeface="Arial"/>
               <a:buChar char="•"/>
             </a:pPr>
@@ -29187,26 +29881,6 @@
               </a:rPr>
               <a:t>Print this out as a meaningful statement (e.g. the range of the data is ##)</a:t>
             </a:r>
-          </a:p>
-          <a:p>
-            <a:pPr marL="342900" indent="-342900">
-              <a:buFont typeface="Arial"/>
-              <a:buChar char="•"/>
-            </a:pPr>
-            <a:endParaRPr lang="en-GB" sz="2000" dirty="0">
-              <a:latin typeface="Arial"/>
-              <a:cs typeface="Arial"/>
-            </a:endParaRPr>
-          </a:p>
-          <a:p>
-            <a:pPr marL="342900" indent="-342900">
-              <a:buFont typeface="Arial"/>
-              <a:buChar char="•"/>
-            </a:pPr>
-            <a:endParaRPr lang="en-GB" sz="2000" dirty="0">
-              <a:latin typeface="Arial"/>
-              <a:cs typeface="Arial"/>
-            </a:endParaRPr>
           </a:p>
         </p:txBody>
       </p:sp>
@@ -30041,6 +30715,9 @@
           </a:lstStyle>
           <a:p>
             <a:pPr marL="342900" indent="-342900">
+              <a:spcBef>
+                <a:spcPts val="1200"/>
+              </a:spcBef>
               <a:buFont typeface="Arial"/>
               <a:buChar char="•"/>
             </a:pPr>
@@ -30049,25 +30726,42 @@
                 <a:latin typeface="Arial"/>
                 <a:cs typeface="Arial"/>
               </a:rPr>
-              <a:t>The </a:t>
-            </a:r>
-            <a:r>
-              <a:rPr lang="en-GB" sz="2000" dirty="0" err="1">
+              <a:t>The</a:t>
+            </a:r>
+            <a:r>
+              <a:rPr lang="en-GB" sz="2000" b="1" dirty="0">
+                <a:latin typeface="Arial"/>
+                <a:cs typeface="Arial"/>
+              </a:rPr>
+              <a:t> </a:t>
+            </a:r>
+            <a:r>
+              <a:rPr lang="en-GB" sz="2000" b="1" dirty="0" err="1">
                 <a:latin typeface="Arial"/>
                 <a:cs typeface="Arial"/>
               </a:rPr>
               <a:t>len</a:t>
             </a:r>
             <a:r>
+              <a:rPr lang="en-GB" sz="2000" b="1" dirty="0">
+                <a:latin typeface="Arial"/>
+                <a:cs typeface="Arial"/>
+              </a:rPr>
+              <a:t>()</a:t>
+            </a:r>
+            <a:r>
               <a:rPr lang="en-GB" sz="2000" dirty="0">
                 <a:latin typeface="Arial"/>
                 <a:cs typeface="Arial"/>
               </a:rPr>
-              <a:t>() command is versatile however and so doesn’t only work with lists</a:t>
+              <a:t> command is versatile however and doesn’t only work with lists</a:t>
             </a:r>
           </a:p>
           <a:p>
             <a:pPr marL="342900" indent="-342900">
+              <a:spcBef>
+                <a:spcPts val="1200"/>
+              </a:spcBef>
               <a:buFont typeface="Arial"/>
               <a:buChar char="•"/>
             </a:pPr>
@@ -30210,7 +30904,7 @@
                 <a:latin typeface="Arial"/>
                 <a:cs typeface="Arial"/>
               </a:rPr>
-              <a:t>Variables Recap</a:t>
+              <a:t>Printing Recap</a:t>
             </a:r>
             <a:endParaRPr lang="en-GB" dirty="0"/>
           </a:p>
@@ -30447,7 +31141,7 @@
                 <a:latin typeface="Arial"/>
                 <a:cs typeface="Arial"/>
               </a:rPr>
-              <a:t>Variables offer a way to assign a name to a piece of data for later use</a:t>
+              <a:t>In the last session, we said that you always need to use print() to get Python to output information to you. This isn’t technically true</a:t>
             </a:r>
           </a:p>
           <a:p>
@@ -30460,7 +31154,7 @@
                 <a:latin typeface="Arial"/>
                 <a:cs typeface="Arial"/>
               </a:rPr>
-              <a:t>Depending on what sort of data you want to store with the variable, the type of the variable will change</a:t>
+              <a:t>Whenever you run code that outputs a value, Python will try to print it automatically</a:t>
             </a:r>
           </a:p>
           <a:p>
@@ -30473,7 +31167,7 @@
                 <a:latin typeface="Arial"/>
                 <a:cs typeface="Arial"/>
               </a:rPr>
-              <a:t>For example, if you wish to store text data, you will create a string variable</a:t>
+              <a:t>This only happens for the last code you evaluate in a cell though</a:t>
             </a:r>
           </a:p>
           <a:p>
@@ -30486,15 +31180,148 @@
                 <a:latin typeface="Arial"/>
                 <a:cs typeface="Arial"/>
               </a:rPr>
-              <a:t>Python will often figure out the correct variable type for your data but you can check this using type() and change the type using int(), float(), str(), etc.</a:t>
-            </a:r>
-          </a:p>
-        </p:txBody>
-      </p:sp>
+              <a:t>Therefore, if we want to output more than one thing, we must use print()</a:t>
+            </a:r>
+          </a:p>
+          <a:p>
+            <a:pPr marL="342900" indent="-342900">
+              <a:buFont typeface="Arial" panose="020B0604020202020204" pitchFamily="34" charset="0"/>
+              <a:buChar char="•"/>
+            </a:pPr>
+            <a:endParaRPr lang="en-GB" sz="2000" dirty="0">
+              <a:latin typeface="Arial"/>
+              <a:cs typeface="Arial"/>
+            </a:endParaRPr>
+          </a:p>
+          <a:p>
+            <a:pPr marL="342900" indent="-342900">
+              <a:buFont typeface="Arial" panose="020B0604020202020204" pitchFamily="34" charset="0"/>
+              <a:buChar char="•"/>
+            </a:pPr>
+            <a:endParaRPr lang="en-GB" sz="2000" dirty="0">
+              <a:latin typeface="Arial"/>
+              <a:cs typeface="Arial"/>
+            </a:endParaRPr>
+          </a:p>
+          <a:p>
+            <a:pPr marL="342900" indent="-342900">
+              <a:buFont typeface="Arial" panose="020B0604020202020204" pitchFamily="34" charset="0"/>
+              <a:buChar char="•"/>
+            </a:pPr>
+            <a:endParaRPr lang="en-GB" sz="2000" dirty="0">
+              <a:latin typeface="Arial"/>
+              <a:cs typeface="Arial"/>
+            </a:endParaRPr>
+          </a:p>
+          <a:p>
+            <a:pPr marL="342900" indent="-342900">
+              <a:buFont typeface="Arial" panose="020B0604020202020204" pitchFamily="34" charset="0"/>
+              <a:buChar char="•"/>
+            </a:pPr>
+            <a:endParaRPr lang="en-GB" sz="2000" dirty="0">
+              <a:latin typeface="Arial"/>
+              <a:cs typeface="Arial"/>
+            </a:endParaRPr>
+          </a:p>
+          <a:p>
+            <a:pPr marL="342900" indent="-342900">
+              <a:buFont typeface="Arial" panose="020B0604020202020204" pitchFamily="34" charset="0"/>
+              <a:buChar char="•"/>
+            </a:pPr>
+            <a:endParaRPr lang="en-GB" sz="2000" dirty="0">
+              <a:latin typeface="Arial"/>
+              <a:cs typeface="Arial"/>
+            </a:endParaRPr>
+          </a:p>
+          <a:p>
+            <a:pPr marL="342900" indent="-342900">
+              <a:buFont typeface="Arial" panose="020B0604020202020204" pitchFamily="34" charset="0"/>
+              <a:buChar char="•"/>
+            </a:pPr>
+            <a:endParaRPr lang="en-GB" sz="2000" dirty="0">
+              <a:latin typeface="Arial"/>
+              <a:cs typeface="Arial"/>
+            </a:endParaRPr>
+          </a:p>
+          <a:p>
+            <a:pPr marL="342900" indent="-342900">
+              <a:buFont typeface="Arial" panose="020B0604020202020204" pitchFamily="34" charset="0"/>
+              <a:buChar char="•"/>
+            </a:pPr>
+            <a:r>
+              <a:rPr lang="en-GB" sz="2000" dirty="0">
+                <a:latin typeface="Arial"/>
+                <a:cs typeface="Arial"/>
+              </a:rPr>
+              <a:t>Sometimes it’s good to use print() just to make it clear too</a:t>
+            </a:r>
+          </a:p>
+        </p:txBody>
+      </p:sp>
+      <p:pic>
+        <p:nvPicPr>
+          <p:cNvPr id="3" name="Picture 2">
+            <a:extLst>
+              <a:ext uri="{FF2B5EF4-FFF2-40B4-BE49-F238E27FC236}">
+                <a16:creationId xmlns:a16="http://schemas.microsoft.com/office/drawing/2014/main" id="{46E3E259-6397-4050-BF6A-F2A168D82FC3}"/>
+              </a:ext>
+            </a:extLst>
+          </p:cNvPr>
+          <p:cNvPicPr>
+            <a:picLocks noChangeAspect="1"/>
+          </p:cNvPicPr>
+          <p:nvPr/>
+        </p:nvPicPr>
+        <p:blipFill>
+          <a:blip r:embed="rId3"/>
+          <a:stretch>
+            <a:fillRect/>
+          </a:stretch>
+        </p:blipFill>
+        <p:spPr>
+          <a:xfrm>
+            <a:off x="1297101" y="2845283"/>
+            <a:ext cx="2732831" cy="1406842"/>
+          </a:xfrm>
+          <a:prstGeom prst="rect">
+            <a:avLst/>
+          </a:prstGeom>
+        </p:spPr>
+      </p:pic>
+      <p:pic>
+        <p:nvPicPr>
+          <p:cNvPr id="5" name="Picture 4">
+            <a:extLst>
+              <a:ext uri="{FF2B5EF4-FFF2-40B4-BE49-F238E27FC236}">
+                <a16:creationId xmlns:a16="http://schemas.microsoft.com/office/drawing/2014/main" id="{1D10843E-B6CB-4976-A6CF-BF3421F91EA3}"/>
+              </a:ext>
+            </a:extLst>
+          </p:cNvPr>
+          <p:cNvPicPr>
+            <a:picLocks noChangeAspect="1"/>
+          </p:cNvPicPr>
+          <p:nvPr/>
+        </p:nvPicPr>
+        <p:blipFill>
+          <a:blip r:embed="rId4"/>
+          <a:stretch>
+            <a:fillRect/>
+          </a:stretch>
+        </p:blipFill>
+        <p:spPr>
+          <a:xfrm>
+            <a:off x="4572000" y="2845283"/>
+            <a:ext cx="2966904" cy="1406842"/>
+          </a:xfrm>
+          <a:prstGeom prst="rect">
+            <a:avLst/>
+          </a:prstGeom>
+        </p:spPr>
+      </p:pic>
     </p:spTree>
     <p:extLst>
       <p:ext uri="{BB962C8B-B14F-4D97-AF65-F5344CB8AC3E}">
-        <p14:creationId xmlns:p14="http://schemas.microsoft.com/office/powerpoint/2010/main" val="2463318137"/>
+        <p14:creationId xmlns:p14="http://schemas.microsoft.com/office/powerpoint/2010/main" val="2890381243"/>
       </p:ext>
     </p:extLst>
   </p:cSld>
@@ -31030,6 +31857,382 @@
 </p:sld>
 </file>
 
+<file path=ppt/slides/slide22.xml><?xml version="1.0" encoding="utf-8"?>
+<p:sld xmlns:a="http://schemas.openxmlformats.org/drawingml/2006/main" xmlns:r="http://schemas.openxmlformats.org/officeDocument/2006/relationships" xmlns:p="http://schemas.openxmlformats.org/presentationml/2006/main">
+  <p:cSld>
+    <p:bg>
+      <p:bgPr>
+        <a:solidFill>
+          <a:schemeClr val="bg1"/>
+        </a:solidFill>
+        <a:effectLst/>
+      </p:bgPr>
+    </p:bg>
+    <p:spTree>
+      <p:nvGrpSpPr>
+        <p:cNvPr id="1" name=""/>
+        <p:cNvGrpSpPr/>
+        <p:nvPr/>
+      </p:nvGrpSpPr>
+      <p:grpSpPr>
+        <a:xfrm>
+          <a:off x="0" y="0"/>
+          <a:ext cx="0" cy="0"/>
+          <a:chOff x="0" y="0"/>
+          <a:chExt cx="0" cy="0"/>
+        </a:xfrm>
+      </p:grpSpPr>
+      <p:sp>
+        <p:nvSpPr>
+          <p:cNvPr id="2" name="Title 1">
+            <a:extLst>
+              <a:ext uri="{FF2B5EF4-FFF2-40B4-BE49-F238E27FC236}">
+                <a16:creationId xmlns:a16="http://schemas.microsoft.com/office/drawing/2014/main" id="{26D8AD59-EFB0-42F3-8BCC-D937A691AD5F}"/>
+              </a:ext>
+            </a:extLst>
+          </p:cNvPr>
+          <p:cNvSpPr>
+            <a:spLocks noGrp="1"/>
+          </p:cNvSpPr>
+          <p:nvPr>
+            <p:ph type="title"/>
+          </p:nvPr>
+        </p:nvSpPr>
+        <p:spPr>
+          <a:xfrm>
+            <a:off x="216001" y="1081682"/>
+            <a:ext cx="4244487" cy="1680866"/>
+          </a:xfrm>
+        </p:spPr>
+        <p:txBody>
+          <a:bodyPr/>
+          <a:lstStyle/>
+          <a:p>
+            <a:r>
+              <a:rPr lang="en-GB" dirty="0"/>
+              <a:t>Thanks for tuning in!</a:t>
+            </a:r>
+            <a:br>
+              <a:rPr lang="en-GB" dirty="0"/>
+            </a:br>
+            <a:br>
+              <a:rPr lang="en-GB" dirty="0"/>
+            </a:br>
+            <a:r>
+              <a:rPr lang="en-GB" dirty="0"/>
+              <a:t>Optional homework </a:t>
+            </a:r>
+            <a:r>
+              <a:rPr lang="en-GB" dirty="0">
+                <a:sym typeface="Wingdings" panose="05000000000000000000" pitchFamily="2" charset="2"/>
+              </a:rPr>
+              <a:t> </a:t>
+            </a:r>
+            <a:endParaRPr lang="en-GB" dirty="0"/>
+          </a:p>
+        </p:txBody>
+      </p:sp>
+      <p:sp>
+        <p:nvSpPr>
+          <p:cNvPr id="12" name="TextBox 11">
+            <a:extLst>
+              <a:ext uri="{FF2B5EF4-FFF2-40B4-BE49-F238E27FC236}">
+                <a16:creationId xmlns:a16="http://schemas.microsoft.com/office/drawing/2014/main" id="{1A6AA38E-A0F5-4F89-9582-57CAF39145FC}"/>
+              </a:ext>
+            </a:extLst>
+          </p:cNvPr>
+          <p:cNvSpPr txBox="1"/>
+          <p:nvPr/>
+        </p:nvSpPr>
+        <p:spPr>
+          <a:xfrm>
+            <a:off x="5783711" y="2330878"/>
+            <a:ext cx="1321594" cy="246221"/>
+          </a:xfrm>
+          <a:prstGeom prst="rect">
+            <a:avLst/>
+          </a:prstGeom>
+          <a:noFill/>
+        </p:spPr>
+        <p:txBody>
+          <a:bodyPr wrap="square" rtlCol="0" anchor="ctr">
+            <a:spAutoFit/>
+          </a:bodyPr>
+          <a:lstStyle/>
+          <a:p>
+            <a:pPr algn="ctr"/>
+            <a:r>
+              <a:rPr lang="en-GB" sz="1000" b="1" dirty="0"/>
+              <a:t>Filled Template</a:t>
+            </a:r>
+          </a:p>
+        </p:txBody>
+      </p:sp>
+      <p:pic>
+        <p:nvPicPr>
+          <p:cNvPr id="13" name="Picture 2" descr="Show notebooks in Drive">
+            <a:extLst>
+              <a:ext uri="{FF2B5EF4-FFF2-40B4-BE49-F238E27FC236}">
+                <a16:creationId xmlns:a16="http://schemas.microsoft.com/office/drawing/2014/main" id="{E1C18D8C-58C2-4149-AA23-C499F568EC15}"/>
+              </a:ext>
+            </a:extLst>
+          </p:cNvPr>
+          <p:cNvPicPr>
+            <a:picLocks noChangeAspect="1" noChangeArrowheads="1"/>
+          </p:cNvPicPr>
+          <p:nvPr/>
+        </p:nvPicPr>
+        <p:blipFill rotWithShape="1">
+          <a:blip r:embed="rId2">
+            <a:extLst>
+              <a:ext uri="{28A0092B-C50C-407E-A947-70E740481C1C}">
+                <a14:useLocalDpi xmlns:a14="http://schemas.microsoft.com/office/drawing/2010/main" val="0"/>
+              </a:ext>
+            </a:extLst>
+          </a:blip>
+          <a:srcRect t="19098" b="19189"/>
+          <a:stretch/>
+        </p:blipFill>
+        <p:spPr bwMode="auto">
+          <a:xfrm>
+            <a:off x="4561623" y="1608232"/>
+            <a:ext cx="1102308" cy="680270"/>
+          </a:xfrm>
+          <a:prstGeom prst="rect">
+            <a:avLst/>
+          </a:prstGeom>
+          <a:noFill/>
+          <a:ln>
+            <a:noFill/>
+          </a:ln>
+          <a:extLst>
+            <a:ext uri="{909E8E84-426E-40DD-AFC4-6F175D3DCCD1}">
+              <a14:hiddenFill xmlns:a14="http://schemas.microsoft.com/office/drawing/2010/main">
+                <a:solidFill>
+                  <a:srgbClr val="FFFFFF"/>
+                </a:solidFill>
+              </a14:hiddenFill>
+            </a:ext>
+          </a:extLst>
+        </p:spPr>
+      </p:pic>
+      <p:sp>
+        <p:nvSpPr>
+          <p:cNvPr id="14" name="TextBox 13">
+            <a:extLst>
+              <a:ext uri="{FF2B5EF4-FFF2-40B4-BE49-F238E27FC236}">
+                <a16:creationId xmlns:a16="http://schemas.microsoft.com/office/drawing/2014/main" id="{2208F9CB-786D-45E9-A30A-090DAC71E2E1}"/>
+              </a:ext>
+            </a:extLst>
+          </p:cNvPr>
+          <p:cNvSpPr txBox="1"/>
+          <p:nvPr/>
+        </p:nvSpPr>
+        <p:spPr>
+          <a:xfrm>
+            <a:off x="4457415" y="2330878"/>
+            <a:ext cx="1321594" cy="246221"/>
+          </a:xfrm>
+          <a:prstGeom prst="rect">
+            <a:avLst/>
+          </a:prstGeom>
+          <a:noFill/>
+        </p:spPr>
+        <p:txBody>
+          <a:bodyPr wrap="square" rtlCol="0" anchor="ctr">
+            <a:spAutoFit/>
+          </a:bodyPr>
+          <a:lstStyle/>
+          <a:p>
+            <a:pPr algn="ctr"/>
+            <a:r>
+              <a:rPr lang="en-GB" sz="1000" b="1" dirty="0"/>
+              <a:t>Blank Template</a:t>
+            </a:r>
+          </a:p>
+        </p:txBody>
+      </p:sp>
+      <p:pic>
+        <p:nvPicPr>
+          <p:cNvPr id="15" name="Picture 4" descr="File:Jupyter logo.svg - Wikimedia Commons">
+            <a:extLst>
+              <a:ext uri="{FF2B5EF4-FFF2-40B4-BE49-F238E27FC236}">
+                <a16:creationId xmlns:a16="http://schemas.microsoft.com/office/drawing/2014/main" id="{D48181D6-C6EF-4133-A822-B68929AE26F5}"/>
+              </a:ext>
+            </a:extLst>
+          </p:cNvPr>
+          <p:cNvPicPr>
+            <a:picLocks noChangeAspect="1" noChangeArrowheads="1"/>
+          </p:cNvPicPr>
+          <p:nvPr/>
+        </p:nvPicPr>
+        <p:blipFill>
+          <a:blip r:embed="rId3">
+            <a:extLst>
+              <a:ext uri="{28A0092B-C50C-407E-A947-70E740481C1C}">
+                <a14:useLocalDpi xmlns:a14="http://schemas.microsoft.com/office/drawing/2010/main" val="0"/>
+              </a:ext>
+            </a:extLst>
+          </a:blip>
+          <a:srcRect/>
+          <a:stretch>
+            <a:fillRect/>
+          </a:stretch>
+        </p:blipFill>
+        <p:spPr bwMode="auto">
+          <a:xfrm>
+            <a:off x="6117644" y="1562863"/>
+            <a:ext cx="649026" cy="752359"/>
+          </a:xfrm>
+          <a:prstGeom prst="rect">
+            <a:avLst/>
+          </a:prstGeom>
+          <a:noFill/>
+          <a:extLst>
+            <a:ext uri="{909E8E84-426E-40DD-AFC4-6F175D3DCCD1}">
+              <a14:hiddenFill xmlns:a14="http://schemas.microsoft.com/office/drawing/2010/main">
+                <a:solidFill>
+                  <a:srgbClr val="FFFFFF"/>
+                </a:solidFill>
+              </a14:hiddenFill>
+            </a:ext>
+          </a:extLst>
+        </p:spPr>
+      </p:pic>
+      <p:sp>
+        <p:nvSpPr>
+          <p:cNvPr id="16" name="Rectangle 15">
+            <a:hlinkClick r:id="rId4"/>
+            <a:extLst>
+              <a:ext uri="{FF2B5EF4-FFF2-40B4-BE49-F238E27FC236}">
+                <a16:creationId xmlns:a16="http://schemas.microsoft.com/office/drawing/2014/main" id="{B5575085-1C13-4A80-86E1-DDE70BEA5456}"/>
+              </a:ext>
+            </a:extLst>
+          </p:cNvPr>
+          <p:cNvSpPr/>
+          <p:nvPr/>
+        </p:nvSpPr>
+        <p:spPr>
+          <a:xfrm>
+            <a:off x="4516466" y="1429561"/>
+            <a:ext cx="1186272" cy="1176867"/>
+          </a:xfrm>
+          <a:prstGeom prst="rect">
+            <a:avLst/>
+          </a:prstGeom>
+          <a:noFill/>
+          <a:ln>
+            <a:solidFill>
+              <a:schemeClr val="bg1">
+                <a:lumMod val="50000"/>
+              </a:schemeClr>
+            </a:solidFill>
+          </a:ln>
+          <a:effectLst/>
+        </p:spPr>
+        <p:style>
+          <a:lnRef idx="1">
+            <a:schemeClr val="accent1"/>
+          </a:lnRef>
+          <a:fillRef idx="3">
+            <a:schemeClr val="accent1"/>
+          </a:fillRef>
+          <a:effectRef idx="2">
+            <a:schemeClr val="accent1"/>
+          </a:effectRef>
+          <a:fontRef idx="minor">
+            <a:schemeClr val="lt1"/>
+          </a:fontRef>
+        </p:style>
+        <p:txBody>
+          <a:bodyPr rtlCol="0" anchor="ctr"/>
+          <a:lstStyle/>
+          <a:p>
+            <a:pPr algn="ctr"/>
+            <a:endParaRPr lang="en-GB">
+              <a:ln>
+                <a:solidFill>
+                  <a:schemeClr val="tx1"/>
+                </a:solidFill>
+              </a:ln>
+            </a:endParaRPr>
+          </a:p>
+        </p:txBody>
+      </p:sp>
+      <p:sp>
+        <p:nvSpPr>
+          <p:cNvPr id="17" name="Rectangle 16">
+            <a:hlinkClick r:id="rId5"/>
+            <a:extLst>
+              <a:ext uri="{FF2B5EF4-FFF2-40B4-BE49-F238E27FC236}">
+                <a16:creationId xmlns:a16="http://schemas.microsoft.com/office/drawing/2014/main" id="{8683B839-408B-4D3A-9561-0775ABDD02AB}"/>
+              </a:ext>
+            </a:extLst>
+          </p:cNvPr>
+          <p:cNvSpPr/>
+          <p:nvPr/>
+        </p:nvSpPr>
+        <p:spPr>
+          <a:xfrm>
+            <a:off x="5849021" y="1429561"/>
+            <a:ext cx="1186272" cy="1176867"/>
+          </a:xfrm>
+          <a:prstGeom prst="rect">
+            <a:avLst/>
+          </a:prstGeom>
+          <a:noFill/>
+          <a:ln>
+            <a:solidFill>
+              <a:schemeClr val="bg1">
+                <a:lumMod val="50000"/>
+              </a:schemeClr>
+            </a:solidFill>
+          </a:ln>
+          <a:effectLst/>
+        </p:spPr>
+        <p:style>
+          <a:lnRef idx="1">
+            <a:schemeClr val="accent1"/>
+          </a:lnRef>
+          <a:fillRef idx="3">
+            <a:schemeClr val="accent1"/>
+          </a:fillRef>
+          <a:effectRef idx="2">
+            <a:schemeClr val="accent1"/>
+          </a:effectRef>
+          <a:fontRef idx="minor">
+            <a:schemeClr val="lt1"/>
+          </a:fontRef>
+        </p:style>
+        <p:txBody>
+          <a:bodyPr rtlCol="0" anchor="ctr"/>
+          <a:lstStyle/>
+          <a:p>
+            <a:pPr algn="ctr"/>
+            <a:endParaRPr lang="en-GB">
+              <a:ln>
+                <a:solidFill>
+                  <a:schemeClr val="tx1"/>
+                </a:solidFill>
+              </a:ln>
+              <a:noFill/>
+            </a:endParaRPr>
+          </a:p>
+        </p:txBody>
+      </p:sp>
+    </p:spTree>
+    <p:extLst>
+      <p:ext uri="{BB962C8B-B14F-4D97-AF65-F5344CB8AC3E}">
+        <p14:creationId xmlns:p14="http://schemas.microsoft.com/office/powerpoint/2010/main" val="2972967479"/>
+      </p:ext>
+    </p:extLst>
+  </p:cSld>
+  <p:clrMapOvr>
+    <a:masterClrMapping/>
+  </p:clrMapOvr>
+</p:sld>
+</file>
+
 <file path=ppt/slides/slide3.xml><?xml version="1.0" encoding="utf-8"?>
 <p:sld xmlns:a="http://schemas.openxmlformats.org/drawingml/2006/main" xmlns:r="http://schemas.openxmlformats.org/officeDocument/2006/relationships" xmlns:p="http://schemas.openxmlformats.org/presentationml/2006/main" showMasterSp="0">
   <p:cSld>
@@ -31073,7 +32276,7 @@
                 <a:latin typeface="Arial"/>
                 <a:cs typeface="Arial"/>
               </a:rPr>
-              <a:t>Printing Recap</a:t>
+              <a:t>Variables Recap</a:t>
             </a:r>
             <a:endParaRPr lang="en-GB" dirty="0"/>
           </a:p>
@@ -31302,6 +32505,9 @@
           </a:lstStyle>
           <a:p>
             <a:pPr marL="342900" indent="-342900">
+              <a:spcAft>
+                <a:spcPts val="1200"/>
+              </a:spcAft>
               <a:buFont typeface="Arial" panose="020B0604020202020204" pitchFamily="34" charset="0"/>
               <a:buChar char="•"/>
             </a:pPr>
@@ -31310,11 +32516,14 @@
                 <a:latin typeface="Arial"/>
                 <a:cs typeface="Arial"/>
               </a:rPr>
-              <a:t>In the last presentation, we said that you always need to use print() to get Python to output information to you. This isn’t technically true</a:t>
+              <a:t>Variables offer a way to assign a name to a piece of data, for later use</a:t>
             </a:r>
           </a:p>
           <a:p>
             <a:pPr marL="342900" indent="-342900">
+              <a:spcAft>
+                <a:spcPts val="1200"/>
+              </a:spcAft>
               <a:buFont typeface="Arial" panose="020B0604020202020204" pitchFamily="34" charset="0"/>
               <a:buChar char="•"/>
             </a:pPr>
@@ -31323,11 +32532,14 @@
                 <a:latin typeface="Arial"/>
                 <a:cs typeface="Arial"/>
               </a:rPr>
-              <a:t>Whenever you run code that outputs a value, Python will try to print it automatically</a:t>
+              <a:t>Depending on what sort of data you want to store with the variable, the type of the variable will change</a:t>
             </a:r>
           </a:p>
           <a:p>
             <a:pPr marL="342900" indent="-342900">
+              <a:spcAft>
+                <a:spcPts val="1200"/>
+              </a:spcAft>
               <a:buFont typeface="Arial" panose="020B0604020202020204" pitchFamily="34" charset="0"/>
               <a:buChar char="•"/>
             </a:pPr>
@@ -31336,11 +32548,14 @@
                 <a:latin typeface="Arial"/>
                 <a:cs typeface="Arial"/>
               </a:rPr>
-              <a:t>This only happens for the last code you evaluate in a cell though</a:t>
+              <a:t>For example, if you wish to store text data, you will create a string variable</a:t>
             </a:r>
           </a:p>
           <a:p>
             <a:pPr marL="342900" indent="-342900">
+              <a:spcAft>
+                <a:spcPts val="1200"/>
+              </a:spcAft>
               <a:buFont typeface="Arial" panose="020B0604020202020204" pitchFamily="34" charset="0"/>
               <a:buChar char="•"/>
             </a:pPr>
@@ -31349,148 +32564,29 @@
                 <a:latin typeface="Arial"/>
                 <a:cs typeface="Arial"/>
               </a:rPr>
-              <a:t>Therefore if we want to output more than one thing, we must use print()</a:t>
-            </a:r>
-          </a:p>
-          <a:p>
-            <a:pPr marL="342900" indent="-342900">
-              <a:buFont typeface="Arial" panose="020B0604020202020204" pitchFamily="34" charset="0"/>
-              <a:buChar char="•"/>
-            </a:pPr>
-            <a:endParaRPr lang="en-GB" sz="2000" dirty="0">
-              <a:latin typeface="Arial"/>
-              <a:cs typeface="Arial"/>
-            </a:endParaRPr>
-          </a:p>
-          <a:p>
-            <a:pPr marL="342900" indent="-342900">
-              <a:buFont typeface="Arial" panose="020B0604020202020204" pitchFamily="34" charset="0"/>
-              <a:buChar char="•"/>
-            </a:pPr>
-            <a:endParaRPr lang="en-GB" sz="2000" dirty="0">
-              <a:latin typeface="Arial"/>
-              <a:cs typeface="Arial"/>
-            </a:endParaRPr>
-          </a:p>
-          <a:p>
-            <a:pPr marL="342900" indent="-342900">
-              <a:buFont typeface="Arial" panose="020B0604020202020204" pitchFamily="34" charset="0"/>
-              <a:buChar char="•"/>
-            </a:pPr>
-            <a:endParaRPr lang="en-GB" sz="2000" dirty="0">
-              <a:latin typeface="Arial"/>
-              <a:cs typeface="Arial"/>
-            </a:endParaRPr>
-          </a:p>
-          <a:p>
-            <a:pPr marL="342900" indent="-342900">
-              <a:buFont typeface="Arial" panose="020B0604020202020204" pitchFamily="34" charset="0"/>
-              <a:buChar char="•"/>
-            </a:pPr>
-            <a:endParaRPr lang="en-GB" sz="2000" dirty="0">
-              <a:latin typeface="Arial"/>
-              <a:cs typeface="Arial"/>
-            </a:endParaRPr>
-          </a:p>
-          <a:p>
-            <a:pPr marL="342900" indent="-342900">
-              <a:buFont typeface="Arial" panose="020B0604020202020204" pitchFamily="34" charset="0"/>
-              <a:buChar char="•"/>
-            </a:pPr>
-            <a:endParaRPr lang="en-GB" sz="2000" dirty="0">
-              <a:latin typeface="Arial"/>
-              <a:cs typeface="Arial"/>
-            </a:endParaRPr>
-          </a:p>
-          <a:p>
-            <a:pPr marL="342900" indent="-342900">
-              <a:buFont typeface="Arial" panose="020B0604020202020204" pitchFamily="34" charset="0"/>
-              <a:buChar char="•"/>
-            </a:pPr>
-            <a:endParaRPr lang="en-GB" sz="2000" dirty="0">
-              <a:latin typeface="Arial"/>
-              <a:cs typeface="Arial"/>
-            </a:endParaRPr>
-          </a:p>
-          <a:p>
-            <a:pPr marL="342900" indent="-342900">
-              <a:buFont typeface="Arial" panose="020B0604020202020204" pitchFamily="34" charset="0"/>
-              <a:buChar char="•"/>
-            </a:pPr>
+              <a:t>Python will often figure out the correct variable type for your data, but you can check this using </a:t>
+            </a:r>
+            <a:r>
+              <a:rPr lang="en-GB" sz="2000" b="1" dirty="0">
+                <a:latin typeface="Arial"/>
+                <a:cs typeface="Arial"/>
+              </a:rPr>
+              <a:t>type()</a:t>
+            </a:r>
             <a:r>
               <a:rPr lang="en-GB" sz="2000" dirty="0">
                 <a:latin typeface="Arial"/>
                 <a:cs typeface="Arial"/>
               </a:rPr>
-              <a:t>Sometimes it’s good to use print() just to make it clear too</a:t>
-            </a:r>
-          </a:p>
-        </p:txBody>
-      </p:sp>
-      <p:pic>
-        <p:nvPicPr>
-          <p:cNvPr id="3" name="Picture 2">
-            <a:extLst>
-              <a:ext uri="{FF2B5EF4-FFF2-40B4-BE49-F238E27FC236}">
-                <a16:creationId xmlns:a16="http://schemas.microsoft.com/office/drawing/2014/main" id="{46E3E259-6397-4050-BF6A-F2A168D82FC3}"/>
-              </a:ext>
-            </a:extLst>
-          </p:cNvPr>
-          <p:cNvPicPr>
-            <a:picLocks noChangeAspect="1"/>
-          </p:cNvPicPr>
-          <p:nvPr/>
-        </p:nvPicPr>
-        <p:blipFill>
-          <a:blip r:embed="rId3"/>
-          <a:stretch>
-            <a:fillRect/>
-          </a:stretch>
-        </p:blipFill>
-        <p:spPr>
-          <a:xfrm>
-            <a:off x="1297101" y="2845283"/>
-            <a:ext cx="2732831" cy="1406842"/>
-          </a:xfrm>
-          <a:prstGeom prst="rect">
-            <a:avLst/>
-          </a:prstGeom>
-        </p:spPr>
-      </p:pic>
-      <p:pic>
-        <p:nvPicPr>
-          <p:cNvPr id="5" name="Picture 4">
-            <a:extLst>
-              <a:ext uri="{FF2B5EF4-FFF2-40B4-BE49-F238E27FC236}">
-                <a16:creationId xmlns:a16="http://schemas.microsoft.com/office/drawing/2014/main" id="{1D10843E-B6CB-4976-A6CF-BF3421F91EA3}"/>
-              </a:ext>
-            </a:extLst>
-          </p:cNvPr>
-          <p:cNvPicPr>
-            <a:picLocks noChangeAspect="1"/>
-          </p:cNvPicPr>
-          <p:nvPr/>
-        </p:nvPicPr>
-        <p:blipFill>
-          <a:blip r:embed="rId4"/>
-          <a:stretch>
-            <a:fillRect/>
-          </a:stretch>
-        </p:blipFill>
-        <p:spPr>
-          <a:xfrm>
-            <a:off x="4572000" y="2845283"/>
-            <a:ext cx="2966904" cy="1406842"/>
-          </a:xfrm>
-          <a:prstGeom prst="rect">
-            <a:avLst/>
-          </a:prstGeom>
-        </p:spPr>
-      </p:pic>
+              <a:t> and change the type using int(), float(), str(), etc.</a:t>
+            </a:r>
+          </a:p>
+        </p:txBody>
+      </p:sp>
     </p:spTree>
     <p:extLst>
       <p:ext uri="{BB962C8B-B14F-4D97-AF65-F5344CB8AC3E}">
-        <p14:creationId xmlns:p14="http://schemas.microsoft.com/office/powerpoint/2010/main" val="2890381243"/>
+        <p14:creationId xmlns:p14="http://schemas.microsoft.com/office/powerpoint/2010/main" val="2463318137"/>
       </p:ext>
     </p:extLst>
   </p:cSld>
@@ -31682,6 +32778,9 @@
           <a:lstStyle/>
           <a:p>
             <a:pPr marL="342900" indent="-342900">
+              <a:spcAft>
+                <a:spcPts val="1200"/>
+              </a:spcAft>
               <a:buChar char="•"/>
             </a:pPr>
             <a:r>
@@ -31694,6 +32793,9 @@
           </a:p>
           <a:p>
             <a:pPr marL="342900" indent="-342900">
+              <a:spcAft>
+                <a:spcPts val="1200"/>
+              </a:spcAft>
               <a:buChar char="•"/>
             </a:pPr>
             <a:r>
@@ -31701,11 +32803,14 @@
                 <a:latin typeface="Arial"/>
                 <a:cs typeface="Arial"/>
               </a:rPr>
-              <a:t>More Variable Typing</a:t>
+              <a:t>More variable typing</a:t>
             </a:r>
           </a:p>
           <a:p>
             <a:pPr marL="342900" indent="-342900">
+              <a:spcAft>
+                <a:spcPts val="1200"/>
+              </a:spcAft>
               <a:buChar char="•"/>
             </a:pPr>
             <a:r>
@@ -31718,6 +32823,9 @@
           </a:p>
           <a:p>
             <a:pPr marL="342900" indent="-342900">
+              <a:spcAft>
+                <a:spcPts val="1200"/>
+              </a:spcAft>
               <a:buChar char="•"/>
             </a:pPr>
             <a:r>
@@ -32015,6 +33123,9 @@
           </a:lstStyle>
           <a:p>
             <a:pPr marL="342900" indent="-342900">
+              <a:spcBef>
+                <a:spcPts val="1200"/>
+              </a:spcBef>
               <a:buFont typeface="Arial"/>
               <a:buChar char="•"/>
             </a:pPr>
@@ -32023,11 +33134,14 @@
                 <a:latin typeface="Arial"/>
                 <a:cs typeface="Arial"/>
               </a:rPr>
-              <a:t>We can use the print() function to let Python talk to us, but how can we talk back?</a:t>
+              <a:t>The print() function allows Python to “talk to us”</a:t>
             </a:r>
           </a:p>
           <a:p>
             <a:pPr marL="342900" indent="-342900">
+              <a:spcBef>
+                <a:spcPts val="1200"/>
+              </a:spcBef>
               <a:buFont typeface="Arial"/>
               <a:buChar char="•"/>
             </a:pPr>
@@ -32036,24 +33150,28 @@
                 <a:latin typeface="Arial"/>
                 <a:cs typeface="Arial"/>
               </a:rPr>
-              <a:t>The input() function allows us to do just this</a:t>
-            </a:r>
-          </a:p>
-          <a:p>
-            <a:pPr marL="342900" indent="-342900">
-              <a:buFont typeface="Arial"/>
-              <a:buChar char="•"/>
-            </a:pPr>
+              <a:t>The </a:t>
+            </a:r>
+            <a:r>
+              <a:rPr lang="en-GB" sz="2000" b="1" dirty="0">
+                <a:latin typeface="Arial"/>
+                <a:cs typeface="Arial"/>
+              </a:rPr>
+              <a:t>input() </a:t>
+            </a:r>
             <a:r>
               <a:rPr lang="en-GB" sz="2000" dirty="0">
                 <a:latin typeface="Arial"/>
                 <a:cs typeface="Arial"/>
               </a:rPr>
-              <a:t>The input function takes one argument which should be a question to ask the user as a string (i.e. in double quotes)</a:t>
+              <a:t>function allows us to “talk back”</a:t>
             </a:r>
           </a:p>
           <a:p>
             <a:pPr marL="342900" indent="-342900">
+              <a:spcBef>
+                <a:spcPts val="1200"/>
+              </a:spcBef>
               <a:buFont typeface="Arial"/>
               <a:buChar char="•"/>
             </a:pPr>
@@ -32062,7 +33180,23 @@
                 <a:latin typeface="Arial"/>
                 <a:cs typeface="Arial"/>
               </a:rPr>
-              <a:t>We can then assign the output of the input command (which will be the user’s response) to a variable to use later</a:t>
+              <a:t>The input function takes one argument, which can be a question to ask the user as a string (i.e. in double quotes)</a:t>
+            </a:r>
+          </a:p>
+          <a:p>
+            <a:pPr marL="342900" indent="-342900">
+              <a:spcBef>
+                <a:spcPts val="1200"/>
+              </a:spcBef>
+              <a:buFont typeface="Arial"/>
+              <a:buChar char="•"/>
+            </a:pPr>
+            <a:r>
+              <a:rPr lang="en-GB" sz="2000" dirty="0">
+                <a:latin typeface="Arial"/>
+                <a:cs typeface="Arial"/>
+              </a:rPr>
+              <a:t>We can assign the output of the input command (which will be the user’s response) to a variable to use later</a:t>
             </a:r>
           </a:p>
         </p:txBody>
@@ -32089,7 +33223,7 @@
         </p:blipFill>
         <p:spPr>
           <a:xfrm>
-            <a:off x="1971942" y="3129525"/>
+            <a:off x="1971942" y="3287005"/>
             <a:ext cx="4804535" cy="1798229"/>
           </a:xfrm>
           <a:prstGeom prst="rect">
@@ -32382,6 +33516,9 @@
           </a:lstStyle>
           <a:p>
             <a:pPr marL="342900" indent="-342900">
+              <a:spcAft>
+                <a:spcPts val="1200"/>
+              </a:spcAft>
               <a:buFont typeface="Arial"/>
               <a:buChar char="•"/>
             </a:pPr>
@@ -32390,34 +33527,34 @@
                 <a:latin typeface="Arial"/>
                 <a:cs typeface="Arial"/>
               </a:rPr>
-              <a:t>For consistency, the input command will </a:t>
+              <a:t>The input command </a:t>
             </a:r>
             <a:r>
               <a:rPr lang="en-GB" sz="2000" b="1" dirty="0">
                 <a:latin typeface="Arial"/>
                 <a:cs typeface="Arial"/>
               </a:rPr>
-              <a:t>always return a string </a:t>
-            </a:r>
+              <a:t>always returns a string</a:t>
+            </a:r>
+            <a:endParaRPr lang="en-GB" sz="2000" dirty="0">
+              <a:latin typeface="Arial"/>
+              <a:cs typeface="Arial"/>
+            </a:endParaRPr>
+          </a:p>
+          <a:p>
+            <a:pPr marL="342900" indent="-342900">
+              <a:spcAft>
+                <a:spcPts val="1200"/>
+              </a:spcAft>
+              <a:buFont typeface="Arial"/>
+              <a:buChar char="•"/>
+            </a:pPr>
             <a:r>
               <a:rPr lang="en-GB" sz="2000" dirty="0">
                 <a:latin typeface="Arial"/>
                 <a:cs typeface="Arial"/>
               </a:rPr>
-              <a:t>even if the user input is better suited for a different type</a:t>
-            </a:r>
-          </a:p>
-          <a:p>
-            <a:pPr marL="342900" indent="-342900">
-              <a:buFont typeface="Arial"/>
-              <a:buChar char="•"/>
-            </a:pPr>
-            <a:r>
-              <a:rPr lang="en-GB" sz="2000" dirty="0">
-                <a:latin typeface="Arial"/>
-                <a:cs typeface="Arial"/>
-              </a:rPr>
-              <a:t>Because of this, you may need to convert the variable storing the user input to a different type</a:t>
+              <a:t>Because of this, it may be necessary to convert the variable storing the user input to a different type, if another type is needed</a:t>
             </a:r>
           </a:p>
         </p:txBody>
@@ -32745,7 +33882,7 @@
                 <a:latin typeface="Arial"/>
                 <a:cs typeface="Arial"/>
               </a:rPr>
-              <a:t>Recall the farm yard animal legs puzzle from the session one homework sheet (shown below). Use the input() function to ask the user how many of each animal there are </a:t>
+              <a:t>The session 1 homework contains a “farm yard animal legs” puzzle (shown below). Use the input() function to ask the user to specify how many of each animal there are in the farm </a:t>
             </a:r>
           </a:p>
           <a:p>
@@ -33197,11 +34334,14 @@
                 <a:latin typeface="Arial"/>
                 <a:cs typeface="Arial"/>
               </a:rPr>
-              <a:t>Note, we wrapped the input() function in int() to convert the input to an integer</a:t>
+              <a:t>Note: we wrapped the input() function into int() to convert to integer</a:t>
             </a:r>
           </a:p>
           <a:p>
             <a:pPr marL="342900" indent="-342900">
+              <a:spcBef>
+                <a:spcPts val="1200"/>
+              </a:spcBef>
               <a:buFont typeface="Arial"/>
               <a:buChar char="•"/>
             </a:pPr>
@@ -33271,7 +34411,7 @@
                 <a:latin typeface="Arial"/>
                 <a:cs typeface="Arial"/>
               </a:rPr>
-              <a:t>Variable Types</a:t>
+              <a:t>Reminder: Variable Types</a:t>
             </a:r>
             <a:endParaRPr lang="en-GB" dirty="0"/>
           </a:p>
@@ -33471,6 +34611,9 @@
           </a:lstStyle>
           <a:p>
             <a:pPr marL="342900" indent="-342900">
+              <a:spcBef>
+                <a:spcPts val="1200"/>
+              </a:spcBef>
               <a:buFont typeface="Arial"/>
               <a:buChar char="•"/>
             </a:pPr>
@@ -33479,24 +34622,28 @@
                 <a:latin typeface="Arial"/>
                 <a:cs typeface="Arial"/>
               </a:rPr>
-              <a:t>Why do variable types matter?</a:t>
-            </a:r>
-          </a:p>
-          <a:p>
-            <a:pPr marL="342900" indent="-342900">
-              <a:buFont typeface="Arial"/>
-              <a:buChar char="•"/>
-            </a:pPr>
+              <a:t>A single function or mathematical operation might behave differently (or not work at all) depending on the </a:t>
+            </a:r>
+            <a:r>
+              <a:rPr lang="en-GB" sz="2000" b="1" dirty="0">
+                <a:latin typeface="Arial"/>
+                <a:cs typeface="Arial"/>
+              </a:rPr>
+              <a:t>type</a:t>
+            </a:r>
             <a:r>
               <a:rPr lang="en-GB" sz="2000" dirty="0">
                 <a:latin typeface="Arial"/>
                 <a:cs typeface="Arial"/>
               </a:rPr>
-              <a:t>A single function or mathematical operation might behave differently (or not work at all) depending on the type of input you give it</a:t>
+              <a:t> of the input you provide</a:t>
             </a:r>
           </a:p>
           <a:p>
             <a:pPr marL="342900" indent="-342900">
+              <a:spcBef>
+                <a:spcPts val="1200"/>
+              </a:spcBef>
               <a:buFont typeface="Arial"/>
               <a:buChar char="•"/>
             </a:pPr>
@@ -33510,6 +34657,9 @@
           </a:p>
           <a:p>
             <a:pPr marL="342900" indent="-342900">
+              <a:spcBef>
+                <a:spcPts val="1200"/>
+              </a:spcBef>
               <a:buFont typeface="Arial"/>
               <a:buChar char="•"/>
             </a:pPr>
@@ -33520,6 +34670,9 @@
           </a:p>
           <a:p>
             <a:pPr marL="342900" indent="-342900">
+              <a:spcBef>
+                <a:spcPts val="1200"/>
+              </a:spcBef>
               <a:buFont typeface="Arial"/>
               <a:buChar char="•"/>
             </a:pPr>
@@ -33529,9 +34682,10 @@
             </a:endParaRPr>
           </a:p>
           <a:p>
-            <a:pPr marL="342900" indent="-342900">
-              <a:buFont typeface="Arial"/>
-              <a:buChar char="•"/>
+            <a:pPr>
+              <a:spcBef>
+                <a:spcPts val="1200"/>
+              </a:spcBef>
             </a:pPr>
             <a:endParaRPr lang="en-GB" sz="2000" dirty="0">
               <a:latin typeface="Arial"/>
@@ -33540,16 +34694,9 @@
           </a:p>
           <a:p>
             <a:pPr marL="342900" indent="-342900">
-              <a:buFont typeface="Arial"/>
-              <a:buChar char="•"/>
-            </a:pPr>
-            <a:endParaRPr lang="en-GB" sz="2000" dirty="0">
-              <a:latin typeface="Arial"/>
-              <a:cs typeface="Arial"/>
-            </a:endParaRPr>
-          </a:p>
-          <a:p>
-            <a:pPr marL="342900" indent="-342900">
+              <a:spcBef>
+                <a:spcPts val="1200"/>
+              </a:spcBef>
               <a:buFont typeface="Arial"/>
               <a:buChar char="•"/>
             </a:pPr>
@@ -33558,7 +34705,7 @@
                 <a:latin typeface="Arial"/>
                 <a:cs typeface="Arial"/>
               </a:rPr>
-              <a:t>The latter example only works if you multiply by an integer though. This is one of many examples where variable type is important</a:t>
+              <a:t>But the second example only works if you multiply by an integer. This is one of many examples where variable type is important</a:t>
             </a:r>
           </a:p>
         </p:txBody>
@@ -33674,7 +34821,7 @@
         </p:blipFill>
         <p:spPr>
           <a:xfrm>
-            <a:off x="2076173" y="3885834"/>
+            <a:off x="2076173" y="3956954"/>
             <a:ext cx="4991654" cy="997210"/>
           </a:xfrm>
           <a:prstGeom prst="rect">

</xml_diff>